<commit_message>
version 1.0, only for guest platform team
</commit_message>
<xml_diff>
--- a/Triage-Tracking-System.pptx
+++ b/Triage-Tracking-System.pptx
@@ -18,8 +18,8 @@
     <p:sldId id="298" r:id="rId6"/>
     <p:sldId id="299" r:id="rId7"/>
     <p:sldId id="300" r:id="rId8"/>
-    <p:sldId id="302" r:id="rId9"/>
-    <p:sldId id="301" r:id="rId10"/>
+    <p:sldId id="301" r:id="rId9"/>
+    <p:sldId id="302" r:id="rId10"/>
     <p:sldId id="303" r:id="rId11"/>
     <p:sldId id="304" r:id="rId12"/>
     <p:sldId id="305" r:id="rId13"/>
@@ -1682,11 +1682,11 @@
 </file>
 
 <file path=ppt/diagrams/colors3.xml><?xml version="1.0" encoding="utf-8"?>
-<dgm:colorsDef xmlns:dgm="http://schemas.openxmlformats.org/drawingml/2006/diagram" xmlns:a="http://schemas.openxmlformats.org/drawingml/2006/main" uniqueId="urn:microsoft.com/office/officeart/2005/8/colors/accent1_2">
+<dgm:colorsDef xmlns:dgm="http://schemas.openxmlformats.org/drawingml/2006/diagram" xmlns:a="http://schemas.openxmlformats.org/drawingml/2006/main" uniqueId="urn:microsoft.com/office/officeart/2005/8/colors/colorful1">
   <dgm:title val=""/>
   <dgm:desc val=""/>
   <dgm:catLst>
-    <dgm:cat type="accent1" pri="11200"/>
+    <dgm:cat type="colorful" pri="10100"/>
   </dgm:catLst>
   <dgm:styleLbl name="node0">
     <dgm:fillClrLst meth="repeat">
@@ -1700,21 +1700,13 @@
     <dgm:txFillClrLst/>
     <dgm:txEffectClrLst/>
   </dgm:styleLbl>
-  <dgm:styleLbl name="alignNode1">
-    <dgm:fillClrLst meth="repeat">
-      <a:schemeClr val="accent1"/>
-    </dgm:fillClrLst>
-    <dgm:linClrLst meth="repeat">
-      <a:schemeClr val="accent1"/>
-    </dgm:linClrLst>
-    <dgm:effectClrLst/>
-    <dgm:txLinClrLst/>
-    <dgm:txFillClrLst/>
-    <dgm:txEffectClrLst/>
-  </dgm:styleLbl>
   <dgm:styleLbl name="node1">
     <dgm:fillClrLst meth="repeat">
-      <a:schemeClr val="accent1"/>
+      <a:schemeClr val="accent2"/>
+      <a:schemeClr val="accent3"/>
+      <a:schemeClr val="accent4"/>
+      <a:schemeClr val="accent5"/>
+      <a:schemeClr val="accent6"/>
     </dgm:fillClrLst>
     <dgm:linClrLst meth="repeat">
       <a:schemeClr val="lt1"/>
@@ -1724,9 +1716,33 @@
     <dgm:txFillClrLst/>
     <dgm:txEffectClrLst/>
   </dgm:styleLbl>
+  <dgm:styleLbl name="alignNode1">
+    <dgm:fillClrLst meth="repeat">
+      <a:schemeClr val="accent2"/>
+      <a:schemeClr val="accent3"/>
+      <a:schemeClr val="accent4"/>
+      <a:schemeClr val="accent5"/>
+      <a:schemeClr val="accent6"/>
+    </dgm:fillClrLst>
+    <dgm:linClrLst meth="repeat">
+      <a:schemeClr val="accent2"/>
+      <a:schemeClr val="accent3"/>
+      <a:schemeClr val="accent4"/>
+      <a:schemeClr val="accent5"/>
+      <a:schemeClr val="accent6"/>
+    </dgm:linClrLst>
+    <dgm:effectClrLst/>
+    <dgm:txLinClrLst/>
+    <dgm:txFillClrLst/>
+    <dgm:txEffectClrLst/>
+  </dgm:styleLbl>
   <dgm:styleLbl name="lnNode1">
     <dgm:fillClrLst meth="repeat">
-      <a:schemeClr val="accent1"/>
+      <a:schemeClr val="accent2"/>
+      <a:schemeClr val="accent3"/>
+      <a:schemeClr val="accent4"/>
+      <a:schemeClr val="accent5"/>
+      <a:schemeClr val="accent6"/>
     </dgm:fillClrLst>
     <dgm:linClrLst meth="repeat">
       <a:schemeClr val="lt1"/>
@@ -1738,7 +1754,19 @@
   </dgm:styleLbl>
   <dgm:styleLbl name="vennNode1">
     <dgm:fillClrLst meth="repeat">
-      <a:schemeClr val="accent1">
+      <a:schemeClr val="accent2">
+        <a:alpha val="50000"/>
+      </a:schemeClr>
+      <a:schemeClr val="accent3">
+        <a:alpha val="50000"/>
+      </a:schemeClr>
+      <a:schemeClr val="accent4">
+        <a:alpha val="50000"/>
+      </a:schemeClr>
+      <a:schemeClr val="accent5">
+        <a:alpha val="50000"/>
+      </a:schemeClr>
+      <a:schemeClr val="accent6">
         <a:alpha val="50000"/>
       </a:schemeClr>
     </dgm:fillClrLst>
@@ -1751,8 +1779,8 @@
     <dgm:txEffectClrLst/>
   </dgm:styleLbl>
   <dgm:styleLbl name="node2">
-    <dgm:fillClrLst meth="repeat">
-      <a:schemeClr val="accent1"/>
+    <dgm:fillClrLst>
+      <a:schemeClr val="accent2"/>
     </dgm:fillClrLst>
     <dgm:linClrLst meth="repeat">
       <a:schemeClr val="lt1"/>
@@ -1763,8 +1791,8 @@
     <dgm:txEffectClrLst/>
   </dgm:styleLbl>
   <dgm:styleLbl name="node3">
-    <dgm:fillClrLst meth="repeat">
-      <a:schemeClr val="accent1"/>
+    <dgm:fillClrLst>
+      <a:schemeClr val="accent3"/>
     </dgm:fillClrLst>
     <dgm:linClrLst meth="repeat">
       <a:schemeClr val="lt1"/>
@@ -1775,8 +1803,8 @@
     <dgm:txEffectClrLst/>
   </dgm:styleLbl>
   <dgm:styleLbl name="node4">
-    <dgm:fillClrLst meth="repeat">
-      <a:schemeClr val="accent1"/>
+    <dgm:fillClrLst>
+      <a:schemeClr val="accent4"/>
     </dgm:fillClrLst>
     <dgm:linClrLst meth="repeat">
       <a:schemeClr val="lt1"/>
@@ -1788,7 +1816,19 @@
   </dgm:styleLbl>
   <dgm:styleLbl name="fgImgPlace1">
     <dgm:fillClrLst meth="repeat">
-      <a:schemeClr val="accent1">
+      <a:schemeClr val="accent2">
+        <a:tint val="50000"/>
+      </a:schemeClr>
+      <a:schemeClr val="accent3">
+        <a:tint val="50000"/>
+      </a:schemeClr>
+      <a:schemeClr val="accent4">
+        <a:tint val="50000"/>
+      </a:schemeClr>
+      <a:schemeClr val="accent5">
+        <a:tint val="50000"/>
+      </a:schemeClr>
+      <a:schemeClr val="accent6">
         <a:tint val="50000"/>
       </a:schemeClr>
     </dgm:fillClrLst>
@@ -1803,9 +1843,12 @@
     <dgm:txEffectClrLst/>
   </dgm:styleLbl>
   <dgm:styleLbl name="alignImgPlace1">
-    <dgm:fillClrLst meth="repeat">
+    <dgm:fillClrLst>
       <a:schemeClr val="accent1">
         <a:tint val="50000"/>
+      </a:schemeClr>
+      <a:schemeClr val="accent2">
+        <a:tint val="20000"/>
       </a:schemeClr>
     </dgm:fillClrLst>
     <dgm:linClrLst meth="repeat">
@@ -1819,9 +1862,12 @@
     <dgm:txEffectClrLst/>
   </dgm:styleLbl>
   <dgm:styleLbl name="bgImgPlace1">
-    <dgm:fillClrLst meth="repeat">
+    <dgm:fillClrLst>
       <a:schemeClr val="accent1">
         <a:tint val="50000"/>
+      </a:schemeClr>
+      <a:schemeClr val="accent2">
+        <a:tint val="20000"/>
       </a:schemeClr>
     </dgm:fillClrLst>
     <dgm:linClrLst meth="repeat">
@@ -1836,14 +1882,14 @@
   </dgm:styleLbl>
   <dgm:styleLbl name="sibTrans2D1">
     <dgm:fillClrLst meth="repeat">
-      <a:schemeClr val="accent1">
-        <a:tint val="60000"/>
-      </a:schemeClr>
+      <a:schemeClr val="accent2"/>
+      <a:schemeClr val="accent3"/>
+      <a:schemeClr val="accent4"/>
+      <a:schemeClr val="accent5"/>
+      <a:schemeClr val="accent6"/>
     </dgm:fillClrLst>
-    <dgm:linClrLst meth="repeat">
-      <a:schemeClr val="accent1">
-        <a:tint val="60000"/>
-      </a:schemeClr>
+    <dgm:linClrLst meth="cycle">
+      <a:schemeClr val="lt1"/>
     </dgm:linClrLst>
     <dgm:effectClrLst/>
     <dgm:txLinClrLst/>
@@ -1852,42 +1898,54 @@
   </dgm:styleLbl>
   <dgm:styleLbl name="fgSibTrans2D1">
     <dgm:fillClrLst meth="repeat">
-      <a:schemeClr val="accent1">
-        <a:tint val="60000"/>
-      </a:schemeClr>
+      <a:schemeClr val="accent2"/>
+      <a:schemeClr val="accent3"/>
+      <a:schemeClr val="accent4"/>
+      <a:schemeClr val="accent5"/>
+      <a:schemeClr val="accent6"/>
     </dgm:fillClrLst>
-    <dgm:linClrLst meth="repeat">
-      <a:schemeClr val="accent1">
-        <a:tint val="60000"/>
-      </a:schemeClr>
+    <dgm:linClrLst meth="cycle">
+      <a:schemeClr val="lt1"/>
     </dgm:linClrLst>
     <dgm:effectClrLst/>
     <dgm:txLinClrLst/>
-    <dgm:txFillClrLst/>
+    <dgm:txFillClrLst meth="repeat">
+      <a:schemeClr val="lt1"/>
+    </dgm:txFillClrLst>
     <dgm:txEffectClrLst/>
   </dgm:styleLbl>
   <dgm:styleLbl name="bgSibTrans2D1">
     <dgm:fillClrLst meth="repeat">
-      <a:schemeClr val="accent1">
-        <a:tint val="60000"/>
-      </a:schemeClr>
+      <a:schemeClr val="accent2"/>
+      <a:schemeClr val="accent3"/>
+      <a:schemeClr val="accent4"/>
+      <a:schemeClr val="accent5"/>
+      <a:schemeClr val="accent6"/>
     </dgm:fillClrLst>
-    <dgm:linClrLst meth="repeat">
-      <a:schemeClr val="accent1">
-        <a:tint val="60000"/>
-      </a:schemeClr>
+    <dgm:linClrLst meth="cycle">
+      <a:schemeClr val="lt1"/>
     </dgm:linClrLst>
     <dgm:effectClrLst/>
     <dgm:txLinClrLst/>
-    <dgm:txFillClrLst/>
+    <dgm:txFillClrLst meth="repeat">
+      <a:schemeClr val="lt1"/>
+    </dgm:txFillClrLst>
     <dgm:txEffectClrLst/>
   </dgm:styleLbl>
   <dgm:styleLbl name="sibTrans1D1">
     <dgm:fillClrLst meth="repeat">
-      <a:schemeClr val="accent1"/>
+      <a:schemeClr val="accent2"/>
+      <a:schemeClr val="accent3"/>
+      <a:schemeClr val="accent4"/>
+      <a:schemeClr val="accent5"/>
+      <a:schemeClr val="accent6"/>
     </dgm:fillClrLst>
     <dgm:linClrLst meth="repeat">
-      <a:schemeClr val="accent1"/>
+      <a:schemeClr val="accent2"/>
+      <a:schemeClr val="accent3"/>
+      <a:schemeClr val="accent4"/>
+      <a:schemeClr val="accent5"/>
+      <a:schemeClr val="accent6"/>
     </dgm:linClrLst>
     <dgm:effectClrLst/>
     <dgm:txLinClrLst/>
@@ -1898,10 +1956,10 @@
   </dgm:styleLbl>
   <dgm:styleLbl name="callout">
     <dgm:fillClrLst meth="repeat">
-      <a:schemeClr val="accent1"/>
+      <a:schemeClr val="accent2"/>
     </dgm:fillClrLst>
     <dgm:linClrLst meth="repeat">
-      <a:schemeClr val="accent1">
+      <a:schemeClr val="accent2">
         <a:tint val="50000"/>
       </a:schemeClr>
     </dgm:linClrLst>
@@ -1926,7 +1984,7 @@
   </dgm:styleLbl>
   <dgm:styleLbl name="asst1">
     <dgm:fillClrLst meth="repeat">
-      <a:schemeClr val="accent1"/>
+      <a:schemeClr val="accent2"/>
     </dgm:fillClrLst>
     <dgm:linClrLst meth="repeat">
       <a:schemeClr val="lt1"/>
@@ -1937,8 +1995,8 @@
     <dgm:txEffectClrLst/>
   </dgm:styleLbl>
   <dgm:styleLbl name="asst2">
-    <dgm:fillClrLst meth="repeat">
-      <a:schemeClr val="accent1"/>
+    <dgm:fillClrLst>
+      <a:schemeClr val="accent3"/>
     </dgm:fillClrLst>
     <dgm:linClrLst meth="repeat">
       <a:schemeClr val="lt1"/>
@@ -1949,8 +2007,8 @@
     <dgm:txEffectClrLst/>
   </dgm:styleLbl>
   <dgm:styleLbl name="asst3">
-    <dgm:fillClrLst meth="repeat">
-      <a:schemeClr val="accent1"/>
+    <dgm:fillClrLst>
+      <a:schemeClr val="accent4"/>
     </dgm:fillClrLst>
     <dgm:linClrLst meth="repeat">
       <a:schemeClr val="lt1"/>
@@ -1961,8 +2019,8 @@
     <dgm:txEffectClrLst/>
   </dgm:styleLbl>
   <dgm:styleLbl name="asst4">
-    <dgm:fillClrLst meth="repeat">
-      <a:schemeClr val="accent1"/>
+    <dgm:fillClrLst>
+      <a:schemeClr val="accent5"/>
     </dgm:fillClrLst>
     <dgm:linClrLst meth="repeat">
       <a:schemeClr val="lt1"/>
@@ -1974,14 +2032,10 @@
   </dgm:styleLbl>
   <dgm:styleLbl name="parChTrans2D1">
     <dgm:fillClrLst meth="repeat">
-      <a:schemeClr val="accent1">
-        <a:tint val="60000"/>
-      </a:schemeClr>
+      <a:schemeClr val="accent2"/>
     </dgm:fillClrLst>
     <dgm:linClrLst meth="repeat">
-      <a:schemeClr val="accent1">
-        <a:tint val="60000"/>
-      </a:schemeClr>
+      <a:schemeClr val="lt1"/>
     </dgm:linClrLst>
     <dgm:effectClrLst/>
     <dgm:txLinClrLst/>
@@ -1992,38 +2046,34 @@
   </dgm:styleLbl>
   <dgm:styleLbl name="parChTrans2D2">
     <dgm:fillClrLst meth="repeat">
-      <a:schemeClr val="accent1"/>
+      <a:schemeClr val="accent3"/>
     </dgm:fillClrLst>
     <dgm:linClrLst meth="repeat">
-      <a:schemeClr val="accent1"/>
+      <a:schemeClr val="lt1"/>
     </dgm:linClrLst>
     <dgm:effectClrLst/>
     <dgm:txLinClrLst/>
-    <dgm:txFillClrLst meth="repeat">
-      <a:schemeClr val="lt1"/>
-    </dgm:txFillClrLst>
+    <dgm:txFillClrLst/>
     <dgm:txEffectClrLst/>
   </dgm:styleLbl>
   <dgm:styleLbl name="parChTrans2D3">
     <dgm:fillClrLst meth="repeat">
-      <a:schemeClr val="accent1"/>
+      <a:schemeClr val="accent4"/>
     </dgm:fillClrLst>
     <dgm:linClrLst meth="repeat">
-      <a:schemeClr val="accent1"/>
+      <a:schemeClr val="lt1"/>
     </dgm:linClrLst>
     <dgm:effectClrLst/>
     <dgm:txLinClrLst/>
-    <dgm:txFillClrLst meth="repeat">
-      <a:schemeClr val="lt1"/>
-    </dgm:txFillClrLst>
+    <dgm:txFillClrLst/>
     <dgm:txEffectClrLst/>
   </dgm:styleLbl>
   <dgm:styleLbl name="parChTrans2D4">
     <dgm:fillClrLst meth="repeat">
-      <a:schemeClr val="accent1"/>
+      <a:schemeClr val="accent5"/>
     </dgm:fillClrLst>
     <dgm:linClrLst meth="repeat">
-      <a:schemeClr val="accent1"/>
+      <a:schemeClr val="lt1"/>
     </dgm:linClrLst>
     <dgm:effectClrLst/>
     <dgm:txLinClrLst/>
@@ -2034,12 +2084,10 @@
   </dgm:styleLbl>
   <dgm:styleLbl name="parChTrans1D1">
     <dgm:fillClrLst meth="repeat">
-      <a:schemeClr val="accent1"/>
+      <a:schemeClr val="accent2"/>
     </dgm:fillClrLst>
     <dgm:linClrLst meth="repeat">
-      <a:schemeClr val="accent1">
-        <a:shade val="60000"/>
-      </a:schemeClr>
+      <a:schemeClr val="accent1"/>
     </dgm:linClrLst>
     <dgm:effectClrLst/>
     <dgm:txLinClrLst/>
@@ -2050,12 +2098,12 @@
   </dgm:styleLbl>
   <dgm:styleLbl name="parChTrans1D2">
     <dgm:fillClrLst meth="repeat">
-      <a:schemeClr val="accent1"/>
+      <a:schemeClr val="accent3">
+        <a:tint val="90000"/>
+      </a:schemeClr>
     </dgm:fillClrLst>
     <dgm:linClrLst meth="repeat">
-      <a:schemeClr val="accent1">
-        <a:shade val="60000"/>
-      </a:schemeClr>
+      <a:schemeClr val="accent2"/>
     </dgm:linClrLst>
     <dgm:effectClrLst/>
     <dgm:txLinClrLst/>
@@ -2066,12 +2114,12 @@
   </dgm:styleLbl>
   <dgm:styleLbl name="parChTrans1D3">
     <dgm:fillClrLst meth="repeat">
-      <a:schemeClr val="accent1"/>
+      <a:schemeClr val="accent4">
+        <a:tint val="70000"/>
+      </a:schemeClr>
     </dgm:fillClrLst>
     <dgm:linClrLst meth="repeat">
-      <a:schemeClr val="accent1">
-        <a:shade val="80000"/>
-      </a:schemeClr>
+      <a:schemeClr val="accent3"/>
     </dgm:linClrLst>
     <dgm:effectClrLst/>
     <dgm:txLinClrLst/>
@@ -2082,12 +2130,12 @@
   </dgm:styleLbl>
   <dgm:styleLbl name="parChTrans1D4">
     <dgm:fillClrLst meth="repeat">
-      <a:schemeClr val="accent1"/>
+      <a:schemeClr val="accent5">
+        <a:tint val="50000"/>
+      </a:schemeClr>
     </dgm:fillClrLst>
     <dgm:linClrLst meth="repeat">
-      <a:schemeClr val="accent1">
-        <a:shade val="80000"/>
-      </a:schemeClr>
+      <a:schemeClr val="accent4"/>
     </dgm:linClrLst>
     <dgm:effectClrLst/>
     <dgm:txLinClrLst/>
@@ -2103,7 +2151,11 @@
       </a:schemeClr>
     </dgm:fillClrLst>
     <dgm:linClrLst meth="repeat">
-      <a:schemeClr val="accent1"/>
+      <a:schemeClr val="accent2"/>
+      <a:schemeClr val="accent3"/>
+      <a:schemeClr val="accent4"/>
+      <a:schemeClr val="accent5"/>
+      <a:schemeClr val="accent6"/>
     </dgm:linClrLst>
     <dgm:effectClrLst/>
     <dgm:txLinClrLst/>
@@ -2119,7 +2171,11 @@
       </a:schemeClr>
     </dgm:fillClrLst>
     <dgm:linClrLst meth="repeat">
-      <a:schemeClr val="accent1"/>
+      <a:schemeClr val="accent2"/>
+      <a:schemeClr val="accent3"/>
+      <a:schemeClr val="accent4"/>
+      <a:schemeClr val="accent5"/>
+      <a:schemeClr val="accent6"/>
     </dgm:linClrLst>
     <dgm:effectClrLst/>
     <dgm:txLinClrLst/>
@@ -2135,7 +2191,11 @@
       </a:schemeClr>
     </dgm:fillClrLst>
     <dgm:linClrLst meth="repeat">
-      <a:schemeClr val="accent1"/>
+      <a:schemeClr val="accent2"/>
+      <a:schemeClr val="accent3"/>
+      <a:schemeClr val="accent4"/>
+      <a:schemeClr val="accent5"/>
+      <a:schemeClr val="accent6"/>
     </dgm:linClrLst>
     <dgm:effectClrLst/>
     <dgm:txLinClrLst/>
@@ -2167,7 +2227,11 @@
       </a:schemeClr>
     </dgm:fillClrLst>
     <dgm:linClrLst meth="repeat">
-      <a:schemeClr val="accent1"/>
+      <a:schemeClr val="accent2"/>
+      <a:schemeClr val="accent3"/>
+      <a:schemeClr val="accent4"/>
+      <a:schemeClr val="accent5"/>
+      <a:schemeClr val="accent6"/>
     </dgm:linClrLst>
     <dgm:effectClrLst/>
     <dgm:txLinClrLst/>
@@ -2181,7 +2245,11 @@
       <a:schemeClr val="lt1"/>
     </dgm:fillClrLst>
     <dgm:linClrLst meth="repeat">
-      <a:schemeClr val="accent1"/>
+      <a:schemeClr val="accent2"/>
+      <a:schemeClr val="accent3"/>
+      <a:schemeClr val="accent4"/>
+      <a:schemeClr val="accent5"/>
+      <a:schemeClr val="accent6"/>
     </dgm:linClrLst>
     <dgm:effectClrLst/>
     <dgm:txLinClrLst/>
@@ -2195,7 +2263,11 @@
       <a:schemeClr val="lt1"/>
     </dgm:fillClrLst>
     <dgm:linClrLst meth="repeat">
-      <a:schemeClr val="accent1"/>
+      <a:schemeClr val="accent2"/>
+      <a:schemeClr val="accent3"/>
+      <a:schemeClr val="accent4"/>
+      <a:schemeClr val="accent5"/>
+      <a:schemeClr val="accent6"/>
     </dgm:linClrLst>
     <dgm:effectClrLst/>
     <dgm:txLinClrLst/>
@@ -2209,7 +2281,11 @@
       <a:schemeClr val="lt1"/>
     </dgm:fillClrLst>
     <dgm:linClrLst meth="repeat">
-      <a:schemeClr val="accent1"/>
+      <a:schemeClr val="accent2"/>
+      <a:schemeClr val="accent3"/>
+      <a:schemeClr val="accent4"/>
+      <a:schemeClr val="accent5"/>
+      <a:schemeClr val="accent6"/>
     </dgm:linClrLst>
     <dgm:effectClrLst/>
     <dgm:txLinClrLst/>
@@ -2220,15 +2296,47 @@
   </dgm:styleLbl>
   <dgm:styleLbl name="fgAccFollowNode1">
     <dgm:fillClrLst meth="repeat">
-      <a:schemeClr val="accent1">
+      <a:schemeClr val="accent2">
+        <a:tint val="40000"/>
         <a:alpha val="90000"/>
+      </a:schemeClr>
+      <a:schemeClr val="accent3">
         <a:tint val="40000"/>
+        <a:alpha val="90000"/>
+      </a:schemeClr>
+      <a:schemeClr val="accent4">
+        <a:tint val="40000"/>
+        <a:alpha val="90000"/>
+      </a:schemeClr>
+      <a:schemeClr val="accent5">
+        <a:tint val="40000"/>
+        <a:alpha val="90000"/>
+      </a:schemeClr>
+      <a:schemeClr val="accent6">
+        <a:tint val="40000"/>
+        <a:alpha val="90000"/>
       </a:schemeClr>
     </dgm:fillClrLst>
     <dgm:linClrLst meth="repeat">
-      <a:schemeClr val="accent1">
+      <a:schemeClr val="accent2">
+        <a:tint val="40000"/>
         <a:alpha val="90000"/>
+      </a:schemeClr>
+      <a:schemeClr val="accent3">
         <a:tint val="40000"/>
+        <a:alpha val="90000"/>
+      </a:schemeClr>
+      <a:schemeClr val="accent4">
+        <a:tint val="40000"/>
+        <a:alpha val="90000"/>
+      </a:schemeClr>
+      <a:schemeClr val="accent5">
+        <a:tint val="40000"/>
+        <a:alpha val="90000"/>
+      </a:schemeClr>
+      <a:schemeClr val="accent6">
+        <a:tint val="40000"/>
+        <a:alpha val="90000"/>
       </a:schemeClr>
     </dgm:linClrLst>
     <dgm:effectClrLst/>
@@ -2240,15 +2348,47 @@
   </dgm:styleLbl>
   <dgm:styleLbl name="alignAccFollowNode1">
     <dgm:fillClrLst meth="repeat">
-      <a:schemeClr val="accent1">
+      <a:schemeClr val="accent2">
+        <a:tint val="40000"/>
         <a:alpha val="90000"/>
+      </a:schemeClr>
+      <a:schemeClr val="accent3">
         <a:tint val="40000"/>
+        <a:alpha val="90000"/>
+      </a:schemeClr>
+      <a:schemeClr val="accent4">
+        <a:tint val="40000"/>
+        <a:alpha val="90000"/>
+      </a:schemeClr>
+      <a:schemeClr val="accent5">
+        <a:tint val="40000"/>
+        <a:alpha val="90000"/>
+      </a:schemeClr>
+      <a:schemeClr val="accent6">
+        <a:tint val="40000"/>
+        <a:alpha val="90000"/>
       </a:schemeClr>
     </dgm:fillClrLst>
     <dgm:linClrLst meth="repeat">
-      <a:schemeClr val="accent1">
+      <a:schemeClr val="accent2">
+        <a:tint val="40000"/>
         <a:alpha val="90000"/>
+      </a:schemeClr>
+      <a:schemeClr val="accent3">
         <a:tint val="40000"/>
+        <a:alpha val="90000"/>
+      </a:schemeClr>
+      <a:schemeClr val="accent4">
+        <a:tint val="40000"/>
+        <a:alpha val="90000"/>
+      </a:schemeClr>
+      <a:schemeClr val="accent5">
+        <a:tint val="40000"/>
+        <a:alpha val="90000"/>
+      </a:schemeClr>
+      <a:schemeClr val="accent6">
+        <a:tint val="40000"/>
+        <a:alpha val="90000"/>
       </a:schemeClr>
     </dgm:linClrLst>
     <dgm:effectClrLst/>
@@ -2260,15 +2400,47 @@
   </dgm:styleLbl>
   <dgm:styleLbl name="bgAccFollowNode1">
     <dgm:fillClrLst meth="repeat">
-      <a:schemeClr val="accent1">
+      <a:schemeClr val="accent2">
+        <a:tint val="40000"/>
         <a:alpha val="90000"/>
+      </a:schemeClr>
+      <a:schemeClr val="accent3">
         <a:tint val="40000"/>
+        <a:alpha val="90000"/>
+      </a:schemeClr>
+      <a:schemeClr val="accent4">
+        <a:tint val="40000"/>
+        <a:alpha val="90000"/>
+      </a:schemeClr>
+      <a:schemeClr val="accent5">
+        <a:tint val="40000"/>
+        <a:alpha val="90000"/>
+      </a:schemeClr>
+      <a:schemeClr val="accent6">
+        <a:tint val="40000"/>
+        <a:alpha val="90000"/>
       </a:schemeClr>
     </dgm:fillClrLst>
     <dgm:linClrLst meth="repeat">
-      <a:schemeClr val="accent1">
+      <a:schemeClr val="accent2">
+        <a:tint val="40000"/>
         <a:alpha val="90000"/>
+      </a:schemeClr>
+      <a:schemeClr val="accent3">
         <a:tint val="40000"/>
+        <a:alpha val="90000"/>
+      </a:schemeClr>
+      <a:schemeClr val="accent4">
+        <a:tint val="40000"/>
+        <a:alpha val="90000"/>
+      </a:schemeClr>
+      <a:schemeClr val="accent5">
+        <a:tint val="40000"/>
+        <a:alpha val="90000"/>
+      </a:schemeClr>
+      <a:schemeClr val="accent6">
+        <a:tint val="40000"/>
+        <a:alpha val="90000"/>
       </a:schemeClr>
     </dgm:linClrLst>
     <dgm:effectClrLst/>
@@ -2284,7 +2456,7 @@
         <a:alpha val="90000"/>
       </a:schemeClr>
     </dgm:fillClrLst>
-    <dgm:linClrLst meth="repeat">
+    <dgm:linClrLst>
       <a:schemeClr val="accent1"/>
     </dgm:linClrLst>
     <dgm:effectClrLst/>
@@ -2300,8 +2472,8 @@
         <a:alpha val="90000"/>
       </a:schemeClr>
     </dgm:fillClrLst>
-    <dgm:linClrLst meth="repeat">
-      <a:schemeClr val="accent1"/>
+    <dgm:linClrLst>
+      <a:schemeClr val="accent2"/>
     </dgm:linClrLst>
     <dgm:effectClrLst/>
     <dgm:txLinClrLst/>
@@ -2316,8 +2488,8 @@
         <a:alpha val="90000"/>
       </a:schemeClr>
     </dgm:fillClrLst>
-    <dgm:linClrLst meth="repeat">
-      <a:schemeClr val="accent1"/>
+    <dgm:linClrLst>
+      <a:schemeClr val="accent3"/>
     </dgm:linClrLst>
     <dgm:effectClrLst/>
     <dgm:txLinClrLst/>
@@ -2332,8 +2504,8 @@
         <a:alpha val="90000"/>
       </a:schemeClr>
     </dgm:fillClrLst>
-    <dgm:linClrLst meth="repeat">
-      <a:schemeClr val="accent1"/>
+    <dgm:linClrLst>
+      <a:schemeClr val="accent4"/>
     </dgm:linClrLst>
     <dgm:effectClrLst/>
     <dgm:txLinClrLst/>
@@ -2344,12 +2516,12 @@
   </dgm:styleLbl>
   <dgm:styleLbl name="bgShp">
     <dgm:fillClrLst meth="repeat">
-      <a:schemeClr val="accent1">
+      <a:schemeClr val="accent2">
         <a:tint val="40000"/>
       </a:schemeClr>
     </dgm:fillClrLst>
     <dgm:linClrLst meth="repeat">
-      <a:schemeClr val="accent1"/>
+      <a:schemeClr val="dk1"/>
     </dgm:linClrLst>
     <dgm:effectClrLst/>
     <dgm:txLinClrLst/>
@@ -2360,12 +2532,12 @@
   </dgm:styleLbl>
   <dgm:styleLbl name="dkBgShp">
     <dgm:fillClrLst meth="repeat">
-      <a:schemeClr val="accent1">
-        <a:shade val="80000"/>
+      <a:schemeClr val="accent2">
+        <a:shade val="90000"/>
       </a:schemeClr>
     </dgm:fillClrLst>
     <dgm:linClrLst meth="repeat">
-      <a:schemeClr val="accent1"/>
+      <a:schemeClr val="dk1"/>
     </dgm:linClrLst>
     <dgm:effectClrLst/>
     <dgm:txLinClrLst/>
@@ -2382,7 +2554,7 @@
       </a:schemeClr>
     </dgm:fillClrLst>
     <dgm:linClrLst meth="repeat">
-      <a:schemeClr val="accent1"/>
+      <a:schemeClr val="accent2"/>
     </dgm:linClrLst>
     <dgm:effectClrLst/>
     <dgm:txLinClrLst/>
@@ -2393,8 +2565,8 @@
   </dgm:styleLbl>
   <dgm:styleLbl name="fgShp">
     <dgm:fillClrLst meth="repeat">
-      <a:schemeClr val="accent1">
-        <a:tint val="60000"/>
+      <a:schemeClr val="accent2">
+        <a:tint val="40000"/>
       </a:schemeClr>
     </dgm:fillClrLst>
     <dgm:linClrLst meth="repeat">
@@ -2659,44 +2831,7 @@
                 <a:lin ang="5400000" scaled="1"/>
               </a:gradFill>
             </a:rPr>
-            <a:t>How do we triage bugs and track </a:t>
-          </a:r>
-          <a:r>
-            <a:rPr lang="en-US" dirty="0" smtClean="0">
-              <a:ln>
-                <a:noFill/>
-              </a:ln>
-              <a:gradFill>
-                <a:gsLst>
-                  <a:gs pos="0">
-                    <a:schemeClr val="accent1">
-                      <a:lumMod val="5000"/>
-                      <a:lumOff val="95000"/>
-                    </a:schemeClr>
-                  </a:gs>
-                  <a:gs pos="74000">
-                    <a:schemeClr val="accent1">
-                      <a:lumMod val="45000"/>
-                      <a:lumOff val="55000"/>
-                    </a:schemeClr>
-                  </a:gs>
-                  <a:gs pos="83000">
-                    <a:schemeClr val="accent1">
-                      <a:lumMod val="45000"/>
-                      <a:lumOff val="55000"/>
-                    </a:schemeClr>
-                  </a:gs>
-                  <a:gs pos="100000">
-                    <a:schemeClr val="accent1">
-                      <a:lumMod val="30000"/>
-                      <a:lumOff val="70000"/>
-                    </a:schemeClr>
-                  </a:gs>
-                </a:gsLst>
-                <a:lin ang="5400000" scaled="1"/>
-              </a:gradFill>
-            </a:rPr>
-            <a:t>them</a:t>
+            <a:t>How do we triage bugs and track them</a:t>
           </a:r>
           <a:r>
             <a:rPr lang="zh-CN" altLang="en-US" dirty="0" smtClean="0">
@@ -3072,175 +3207,6 @@
         </a:p>
       </dgm:t>
     </dgm:pt>
-    <dgm:pt modelId="{4225ECE5-9F36-42CB-B898-2E37361B5365}">
-      <dgm:prSet phldrT="[Text]"/>
-      <dgm:spPr/>
-      <dgm:t>
-        <a:bodyPr/>
-        <a:lstStyle/>
-        <a:p>
-          <a:r>
-            <a:rPr lang="en-US" dirty="0" smtClean="0">
-              <a:ln>
-                <a:noFill/>
-              </a:ln>
-              <a:gradFill>
-                <a:gsLst>
-                  <a:gs pos="0">
-                    <a:schemeClr val="accent1">
-                      <a:lumMod val="5000"/>
-                      <a:lumOff val="95000"/>
-                    </a:schemeClr>
-                  </a:gs>
-                  <a:gs pos="74000">
-                    <a:schemeClr val="accent1">
-                      <a:lumMod val="45000"/>
-                      <a:lumOff val="55000"/>
-                    </a:schemeClr>
-                  </a:gs>
-                  <a:gs pos="83000">
-                    <a:schemeClr val="accent1">
-                      <a:lumMod val="45000"/>
-                      <a:lumOff val="55000"/>
-                    </a:schemeClr>
-                  </a:gs>
-                  <a:gs pos="100000">
-                    <a:schemeClr val="accent1">
-                      <a:lumMod val="30000"/>
-                      <a:lumOff val="70000"/>
-                    </a:schemeClr>
-                  </a:gs>
-                </a:gsLst>
-                <a:lin ang="5400000" scaled="1"/>
-              </a:gradFill>
-            </a:rPr>
-            <a:t>Workflow</a:t>
-          </a:r>
-          <a:endParaRPr lang="en-US" dirty="0">
-            <a:ln>
-              <a:noFill/>
-            </a:ln>
-            <a:gradFill>
-              <a:gsLst>
-                <a:gs pos="0">
-                  <a:schemeClr val="accent1">
-                    <a:lumMod val="5000"/>
-                    <a:lumOff val="95000"/>
-                  </a:schemeClr>
-                </a:gs>
-                <a:gs pos="74000">
-                  <a:schemeClr val="accent1">
-                    <a:lumMod val="45000"/>
-                    <a:lumOff val="55000"/>
-                  </a:schemeClr>
-                </a:gs>
-                <a:gs pos="83000">
-                  <a:schemeClr val="accent1">
-                    <a:lumMod val="45000"/>
-                    <a:lumOff val="55000"/>
-                  </a:schemeClr>
-                </a:gs>
-                <a:gs pos="100000">
-                  <a:schemeClr val="accent1">
-                    <a:lumMod val="30000"/>
-                    <a:lumOff val="70000"/>
-                  </a:schemeClr>
-                </a:gs>
-              </a:gsLst>
-              <a:lin ang="5400000" scaled="1"/>
-            </a:gradFill>
-          </a:endParaRPr>
-        </a:p>
-      </dgm:t>
-    </dgm:pt>
-    <dgm:pt modelId="{CBB6B862-92F5-4FDA-90D4-230DEA1DCAAC}" type="parTrans" cxnId="{5D293882-B666-4520-8EEC-1484C1BCF164}">
-      <dgm:prSet/>
-      <dgm:spPr/>
-      <dgm:t>
-        <a:bodyPr/>
-        <a:lstStyle/>
-        <a:p>
-          <a:endParaRPr lang="en-US">
-            <a:ln>
-              <a:noFill/>
-            </a:ln>
-            <a:gradFill>
-              <a:gsLst>
-                <a:gs pos="0">
-                  <a:schemeClr val="accent1">
-                    <a:lumMod val="5000"/>
-                    <a:lumOff val="95000"/>
-                  </a:schemeClr>
-                </a:gs>
-                <a:gs pos="74000">
-                  <a:schemeClr val="accent1">
-                    <a:lumMod val="45000"/>
-                    <a:lumOff val="55000"/>
-                  </a:schemeClr>
-                </a:gs>
-                <a:gs pos="83000">
-                  <a:schemeClr val="accent1">
-                    <a:lumMod val="45000"/>
-                    <a:lumOff val="55000"/>
-                  </a:schemeClr>
-                </a:gs>
-                <a:gs pos="100000">
-                  <a:schemeClr val="accent1">
-                    <a:lumMod val="30000"/>
-                    <a:lumOff val="70000"/>
-                  </a:schemeClr>
-                </a:gs>
-              </a:gsLst>
-              <a:lin ang="5400000" scaled="1"/>
-            </a:gradFill>
-          </a:endParaRPr>
-        </a:p>
-      </dgm:t>
-    </dgm:pt>
-    <dgm:pt modelId="{8C432092-408E-40DB-AB1B-35A989E757A1}" type="sibTrans" cxnId="{5D293882-B666-4520-8EEC-1484C1BCF164}">
-      <dgm:prSet/>
-      <dgm:spPr/>
-      <dgm:t>
-        <a:bodyPr/>
-        <a:lstStyle/>
-        <a:p>
-          <a:endParaRPr lang="en-US">
-            <a:ln>
-              <a:noFill/>
-            </a:ln>
-            <a:gradFill>
-              <a:gsLst>
-                <a:gs pos="0">
-                  <a:schemeClr val="accent1">
-                    <a:lumMod val="5000"/>
-                    <a:lumOff val="95000"/>
-                  </a:schemeClr>
-                </a:gs>
-                <a:gs pos="74000">
-                  <a:schemeClr val="accent1">
-                    <a:lumMod val="45000"/>
-                    <a:lumOff val="55000"/>
-                  </a:schemeClr>
-                </a:gs>
-                <a:gs pos="83000">
-                  <a:schemeClr val="accent1">
-                    <a:lumMod val="45000"/>
-                    <a:lumOff val="55000"/>
-                  </a:schemeClr>
-                </a:gs>
-                <a:gs pos="100000">
-                  <a:schemeClr val="accent1">
-                    <a:lumMod val="30000"/>
-                    <a:lumOff val="70000"/>
-                  </a:schemeClr>
-                </a:gs>
-              </a:gsLst>
-              <a:lin ang="5400000" scaled="1"/>
-            </a:gradFill>
-          </a:endParaRPr>
-        </a:p>
-      </dgm:t>
-    </dgm:pt>
     <dgm:pt modelId="{8FF0C27D-EC75-4F1A-8771-F5EE1076C2B8}">
       <dgm:prSet phldrT="[Text]"/>
       <dgm:spPr/>
@@ -3392,7 +3358,7 @@
                 <a:lin ang="5400000" scaled="1"/>
               </a:gradFill>
             </a:rPr>
-            <a:t>Suggestions</a:t>
+            <a:t>Known issues</a:t>
           </a:r>
           <a:endParaRPr lang="en-US" dirty="0">
             <a:ln>
@@ -3495,7 +3461,7 @@
                 <a:lin ang="5400000" scaled="1"/>
               </a:gradFill>
             </a:rPr>
-            <a:t>Modules</a:t>
+            <a:t>Workflow</a:t>
           </a:r>
           <a:endParaRPr lang="en-US" dirty="0">
             <a:ln>
@@ -3553,6 +3519,109 @@
         <a:lstStyle/>
         <a:p>
           <a:endParaRPr lang="zh-CN" altLang="en-US"/>
+        </a:p>
+      </dgm:t>
+    </dgm:pt>
+    <dgm:pt modelId="{DED1FA87-4201-4CBA-8424-F7E064EFB6F3}">
+      <dgm:prSet phldrT="[Text]"/>
+      <dgm:spPr/>
+      <dgm:t>
+        <a:bodyPr/>
+        <a:lstStyle/>
+        <a:p>
+          <a:r>
+            <a:rPr lang="en-US" dirty="0" smtClean="0">
+              <a:ln>
+                <a:noFill/>
+              </a:ln>
+              <a:gradFill>
+                <a:gsLst>
+                  <a:gs pos="0">
+                    <a:schemeClr val="accent1">
+                      <a:lumMod val="5000"/>
+                      <a:lumOff val="95000"/>
+                    </a:schemeClr>
+                  </a:gs>
+                  <a:gs pos="74000">
+                    <a:schemeClr val="accent1">
+                      <a:lumMod val="45000"/>
+                      <a:lumOff val="55000"/>
+                    </a:schemeClr>
+                  </a:gs>
+                  <a:gs pos="83000">
+                    <a:schemeClr val="accent1">
+                      <a:lumMod val="45000"/>
+                      <a:lumOff val="55000"/>
+                    </a:schemeClr>
+                  </a:gs>
+                  <a:gs pos="100000">
+                    <a:schemeClr val="accent1">
+                      <a:lumMod val="30000"/>
+                      <a:lumOff val="70000"/>
+                    </a:schemeClr>
+                  </a:gs>
+                </a:gsLst>
+                <a:lin ang="5400000" scaled="1"/>
+              </a:gradFill>
+            </a:rPr>
+            <a:t>Modules</a:t>
+          </a:r>
+          <a:endParaRPr lang="en-US" dirty="0">
+            <a:ln>
+              <a:noFill/>
+            </a:ln>
+            <a:gradFill>
+              <a:gsLst>
+                <a:gs pos="0">
+                  <a:schemeClr val="accent1">
+                    <a:lumMod val="5000"/>
+                    <a:lumOff val="95000"/>
+                  </a:schemeClr>
+                </a:gs>
+                <a:gs pos="74000">
+                  <a:schemeClr val="accent1">
+                    <a:lumMod val="45000"/>
+                    <a:lumOff val="55000"/>
+                  </a:schemeClr>
+                </a:gs>
+                <a:gs pos="83000">
+                  <a:schemeClr val="accent1">
+                    <a:lumMod val="45000"/>
+                    <a:lumOff val="55000"/>
+                  </a:schemeClr>
+                </a:gs>
+                <a:gs pos="100000">
+                  <a:schemeClr val="accent1">
+                    <a:lumMod val="30000"/>
+                    <a:lumOff val="70000"/>
+                  </a:schemeClr>
+                </a:gs>
+              </a:gsLst>
+              <a:lin ang="5400000" scaled="1"/>
+            </a:gradFill>
+          </a:endParaRPr>
+        </a:p>
+      </dgm:t>
+    </dgm:pt>
+    <dgm:pt modelId="{2262F461-4158-4668-916A-476F7E6A2D30}" type="parTrans" cxnId="{AC1B5AF7-70B8-4DE1-A341-1E2224628A05}">
+      <dgm:prSet/>
+      <dgm:spPr/>
+      <dgm:t>
+        <a:bodyPr/>
+        <a:lstStyle/>
+        <a:p>
+          <a:endParaRPr lang="en-US"/>
+        </a:p>
+      </dgm:t>
+    </dgm:pt>
+    <dgm:pt modelId="{C6BC4D5C-2BED-4026-839E-0B3FF572EB63}" type="sibTrans" cxnId="{AC1B5AF7-70B8-4DE1-A341-1E2224628A05}">
+      <dgm:prSet/>
+      <dgm:spPr/>
+      <dgm:t>
+        <a:bodyPr/>
+        <a:lstStyle/>
+        <a:p>
+          <a:endParaRPr lang="en-US"/>
         </a:p>
       </dgm:t>
     </dgm:pt>
@@ -3654,19 +3723,19 @@
   <dgm:cxnLst>
     <dgm:cxn modelId="{0EF52584-59BF-46FF-9B62-BAC68CD745D6}" srcId="{32B18A27-61F1-4CFA-94AF-D47B795DD0BF}" destId="{270F60FD-A3C1-49A8-8A86-F7687747748F}" srcOrd="0" destOrd="0" parTransId="{100FF235-852D-4923-8777-23CA0F8966CA}" sibTransId="{A6F406C8-7AED-4C43-A288-DFBAE8AD8AF1}"/>
     <dgm:cxn modelId="{AC27C366-59FD-A041-B915-D856C6F3D14F}" type="presOf" srcId="{A9301DD2-70F2-B84F-BEBA-E2C2848A96E0}" destId="{C454690B-E0A9-4861-BD7E-E4C2EE224376}" srcOrd="0" destOrd="0" presId="urn:microsoft.com/office/officeart/2005/8/layout/vList2"/>
+    <dgm:cxn modelId="{9B00ADEC-0B76-424E-99C7-AAF261BE7309}" srcId="{C4005E28-BDFB-4D90-8A33-ED884B4542F9}" destId="{A9301DD2-70F2-B84F-BEBA-E2C2848A96E0}" srcOrd="0" destOrd="0" parTransId="{F1661BB2-6BE9-9540-8603-EC78647E08DC}" sibTransId="{1CF95721-A8A8-2244-90C5-D76C7989B01B}"/>
     <dgm:cxn modelId="{E77DD80B-ECB7-46C0-8091-274292493D27}" type="presOf" srcId="{994B4CCC-56B5-4912-9791-3CB36757F392}" destId="{A2E78C65-B470-4BEB-B5B9-41A9E6602AEE}" srcOrd="0" destOrd="0" presId="urn:microsoft.com/office/officeart/2005/8/layout/vList2"/>
-    <dgm:cxn modelId="{9B00ADEC-0B76-424E-99C7-AAF261BE7309}" srcId="{C4005E28-BDFB-4D90-8A33-ED884B4542F9}" destId="{A9301DD2-70F2-B84F-BEBA-E2C2848A96E0}" srcOrd="0" destOrd="0" parTransId="{F1661BB2-6BE9-9540-8603-EC78647E08DC}" sibTransId="{1CF95721-A8A8-2244-90C5-D76C7989B01B}"/>
     <dgm:cxn modelId="{EA964011-401B-45A8-A6F0-2550E9416835}" srcId="{C4005E28-BDFB-4D90-8A33-ED884B4542F9}" destId="{8FF0C27D-EC75-4F1A-8771-F5EE1076C2B8}" srcOrd="2" destOrd="0" parTransId="{D79450FC-AB86-43D2-8951-BFE61342C29A}" sibTransId="{748372B1-D137-49EC-8BA3-15FEBCB42ED3}"/>
     <dgm:cxn modelId="{5FFFA853-F033-4C18-95C2-7BE4AF2B76BD}" srcId="{994B4CCC-56B5-4912-9791-3CB36757F392}" destId="{C4005E28-BDFB-4D90-8A33-ED884B4542F9}" srcOrd="1" destOrd="0" parTransId="{93F35381-539E-4ABA-B4E2-E34053CE3534}" sibTransId="{F7E7A409-9054-440E-B037-A1D31A7F956E}"/>
-    <dgm:cxn modelId="{5D293882-B666-4520-8EEC-1484C1BCF164}" srcId="{C4005E28-BDFB-4D90-8A33-ED884B4542F9}" destId="{4225ECE5-9F36-42CB-B898-2E37361B5365}" srcOrd="1" destOrd="0" parTransId="{CBB6B862-92F5-4FDA-90D4-230DEA1DCAAC}" sibTransId="{8C432092-408E-40DB-AB1B-35A989E757A1}"/>
+    <dgm:cxn modelId="{926551DB-0CCB-4F83-95D1-54FAC5A102BB}" type="presOf" srcId="{270F60FD-A3C1-49A8-8A86-F7687747748F}" destId="{A7656790-362F-4705-96F5-27E364DEA4C6}" srcOrd="0" destOrd="0" presId="urn:microsoft.com/office/officeart/2005/8/layout/vList2"/>
     <dgm:cxn modelId="{A19E40CF-40B1-4CC7-9C6B-2D4FF09C280E}" type="presOf" srcId="{98F60035-7B9F-4454-8FA8-9494002FDD0B}" destId="{5C15B2CB-BED6-4B09-8BEE-E55740374D20}" srcOrd="0" destOrd="0" presId="urn:microsoft.com/office/officeart/2005/8/layout/vList2"/>
     <dgm:cxn modelId="{BE02CCFE-2757-429E-A5E5-E603FDA7B848}" type="presOf" srcId="{32B18A27-61F1-4CFA-94AF-D47B795DD0BF}" destId="{FE990D3D-071A-464E-8AA4-DC552A342919}" srcOrd="0" destOrd="0" presId="urn:microsoft.com/office/officeart/2005/8/layout/vList2"/>
-    <dgm:cxn modelId="{926551DB-0CCB-4F83-95D1-54FAC5A102BB}" type="presOf" srcId="{270F60FD-A3C1-49A8-8A86-F7687747748F}" destId="{A7656790-362F-4705-96F5-27E364DEA4C6}" srcOrd="0" destOrd="0" presId="urn:microsoft.com/office/officeart/2005/8/layout/vList2"/>
     <dgm:cxn modelId="{6CD77E08-CD71-4C27-91AB-6C8D02E46124}" srcId="{994B4CCC-56B5-4912-9791-3CB36757F392}" destId="{32B18A27-61F1-4CFA-94AF-D47B795DD0BF}" srcOrd="0" destOrd="0" parTransId="{627A7E87-90CB-4153-9FCE-D37D3151EE6F}" sibTransId="{052FB2ED-9B4B-4189-8259-DF2ED79A4D8E}"/>
     <dgm:cxn modelId="{8D426945-F097-4C5B-8610-DE83B1A46B88}" srcId="{994B4CCC-56B5-4912-9791-3CB36757F392}" destId="{98F60035-7B9F-4454-8FA8-9494002FDD0B}" srcOrd="2" destOrd="0" parTransId="{8C9FC7BC-85BE-49F9-9450-2061DAFAAF61}" sibTransId="{7D8F87EF-0434-4BDF-A795-B4ABD50AB1EF}"/>
-    <dgm:cxn modelId="{6EE8756D-E464-41A7-9D7E-596E68581EBD}" type="presOf" srcId="{4225ECE5-9F36-42CB-B898-2E37361B5365}" destId="{C454690B-E0A9-4861-BD7E-E4C2EE224376}" srcOrd="0" destOrd="1" presId="urn:microsoft.com/office/officeart/2005/8/layout/vList2"/>
     <dgm:cxn modelId="{C1309B58-E9A6-4176-97FE-AC8F29E8E199}" type="presOf" srcId="{C4005E28-BDFB-4D90-8A33-ED884B4542F9}" destId="{3D5F56F0-D39A-4346-89F3-344301740072}" srcOrd="0" destOrd="0" presId="urn:microsoft.com/office/officeart/2005/8/layout/vList2"/>
+    <dgm:cxn modelId="{B069039D-2FFA-442C-AA2F-D802A300E7B3}" type="presOf" srcId="{DED1FA87-4201-4CBA-8424-F7E064EFB6F3}" destId="{C454690B-E0A9-4861-BD7E-E4C2EE224376}" srcOrd="0" destOrd="1" presId="urn:microsoft.com/office/officeart/2005/8/layout/vList2"/>
     <dgm:cxn modelId="{3B87408A-4756-4BA0-9A23-641F9A5E1658}" type="presOf" srcId="{8FF0C27D-EC75-4F1A-8771-F5EE1076C2B8}" destId="{C454690B-E0A9-4861-BD7E-E4C2EE224376}" srcOrd="0" destOrd="2" presId="urn:microsoft.com/office/officeart/2005/8/layout/vList2"/>
+    <dgm:cxn modelId="{AC1B5AF7-70B8-4DE1-A341-1E2224628A05}" srcId="{C4005E28-BDFB-4D90-8A33-ED884B4542F9}" destId="{DED1FA87-4201-4CBA-8424-F7E064EFB6F3}" srcOrd="1" destOrd="0" parTransId="{2262F461-4158-4668-916A-476F7E6A2D30}" sibTransId="{C6BC4D5C-2BED-4026-839E-0B3FF572EB63}"/>
     <dgm:cxn modelId="{34C85048-40E6-481C-BB24-C023047F0814}" type="presParOf" srcId="{A2E78C65-B470-4BEB-B5B9-41A9E6602AEE}" destId="{FE990D3D-071A-464E-8AA4-DC552A342919}" srcOrd="0" destOrd="0" presId="urn:microsoft.com/office/officeart/2005/8/layout/vList2"/>
     <dgm:cxn modelId="{B1D3B380-A6AB-4A87-A085-516E28DB2484}" type="presParOf" srcId="{A2E78C65-B470-4BEB-B5B9-41A9E6602AEE}" destId="{A7656790-362F-4705-96F5-27E364DEA4C6}" srcOrd="1" destOrd="0" presId="urn:microsoft.com/office/officeart/2005/8/layout/vList2"/>
     <dgm:cxn modelId="{17CE9167-B668-4DE7-96CE-2E8E35A04E14}" type="presParOf" srcId="{A2E78C65-B470-4BEB-B5B9-41A9E6602AEE}" destId="{3D5F56F0-D39A-4346-89F3-344301740072}" srcOrd="2" destOrd="0" presId="urn:microsoft.com/office/officeart/2005/8/layout/vList2"/>
@@ -3717,7 +3786,15 @@
         <a:p>
           <a:r>
             <a:rPr lang="en-US" dirty="0" smtClean="0"/>
-            <a:t> bug</a:t>
+            <a:t> </a:t>
+          </a:r>
+          <a:r>
+            <a:rPr lang="en-US" dirty="0" smtClean="0">
+              <a:solidFill>
+                <a:srgbClr val="FFFF00"/>
+              </a:solidFill>
+            </a:rPr>
+            <a:t>bug</a:t>
           </a:r>
         </a:p>
         <a:p>
@@ -3977,7 +4054,11 @@
             <a:rPr lang="en-US" sz="2000" dirty="0" smtClean="0">
               <a:hlinkClick xmlns:r="http://schemas.openxmlformats.org/officeDocument/2006/relationships" r:id="rId2"/>
             </a:rPr>
-            <a:t>triagingBugsLink</a:t>
+            <a:t>Triaging</a:t>
+          </a:r>
+          <a:r>
+            <a:rPr lang="en-US" sz="2000" dirty="0" smtClean="0"/>
+            <a:t>  Bugs, filters incoming bugs</a:t>
           </a:r>
           <a:endParaRPr lang="en-US" sz="2000" dirty="0"/>
         </a:p>
@@ -4095,7 +4176,7 @@
       </dgm:t>
     </dgm:pt>
     <dgm:pt modelId="{52FF9941-5C83-4AA1-9BC2-A25757A7619D}" type="pres">
-      <dgm:prSet presAssocID="{EDA0C1EF-723B-4077-903B-5BD3E62F531B}" presName="ChildText" presStyleLbl="revTx" presStyleIdx="1" presStyleCnt="3" custScaleX="313313" custLinFactX="4055" custLinFactNeighborX="100000" custLinFactNeighborY="2325">
+      <dgm:prSet presAssocID="{EDA0C1EF-723B-4077-903B-5BD3E62F531B}" presName="ChildText" presStyleLbl="revTx" presStyleIdx="1" presStyleCnt="3" custScaleX="354153" custLinFactX="14888" custLinFactNeighborX="100000" custLinFactNeighborY="1863">
         <dgm:presLayoutVars>
           <dgm:chMax val="0"/>
           <dgm:chPref val="0"/>
@@ -4155,21 +4236,21 @@
     </dgm:pt>
   </dgm:ptLst>
   <dgm:cxnLst>
+    <dgm:cxn modelId="{FDB416E6-B93F-4932-8ACF-62D1B8A7F386}" srcId="{35AA06C3-8984-486D-BC3B-EC00502C7623}" destId="{DF5A3E90-4696-46A9-BD66-BD8ADCF04CFB}" srcOrd="0" destOrd="0" parTransId="{089E7FCE-8C4E-4D9A-B374-CC868B6359E3}" sibTransId="{8EF020F2-411F-48EA-B5EA-E45713AB9C65}"/>
+    <dgm:cxn modelId="{F2999149-6DA8-4EC9-BA95-B8A0939D716B}" type="presOf" srcId="{3708D046-9E3C-4FEF-9CB2-2961D5EB57D1}" destId="{E8045478-C45D-4664-BE67-F4C0E36E70C3}" srcOrd="0" destOrd="0" presId="urn:microsoft.com/office/officeart/2005/8/layout/StepDownProcess"/>
+    <dgm:cxn modelId="{F40718B0-42F8-4A8A-B955-0A6C1DF51704}" srcId="{E451963A-DE2F-45E1-B638-1D73785D3F04}" destId="{EDA0C1EF-723B-4077-903B-5BD3E62F531B}" srcOrd="1" destOrd="0" parTransId="{64A6E2B9-7717-411C-BD88-BFF83A12CEF2}" sibTransId="{94EF8850-4C04-4B55-8A66-F900BE881D39}"/>
+    <dgm:cxn modelId="{7257EFC0-D5BB-4A88-8424-A555CDBBA981}" srcId="{EDA0C1EF-723B-4077-903B-5BD3E62F531B}" destId="{4EA42339-E69B-4AEF-8ACD-CC5DDF7DC5B8}" srcOrd="0" destOrd="0" parTransId="{613FD060-3A8A-4CBD-A43C-94BDC8219467}" sibTransId="{4D078FCB-9D12-4368-9D31-E3F1AFB1B920}"/>
+    <dgm:cxn modelId="{414B9940-C15B-4D58-8E65-392EB6BA631F}" type="presOf" srcId="{4EA42339-E69B-4AEF-8ACD-CC5DDF7DC5B8}" destId="{52FF9941-5C83-4AA1-9BC2-A25757A7619D}" srcOrd="0" destOrd="0" presId="urn:microsoft.com/office/officeart/2005/8/layout/StepDownProcess"/>
+    <dgm:cxn modelId="{BA78F93A-EEC4-4E1F-A87F-7EE4F6F6CC1A}" type="presOf" srcId="{27B86D4C-8899-4C39-975A-36EC81AA73DB}" destId="{E8045478-C45D-4664-BE67-F4C0E36E70C3}" srcOrd="0" destOrd="1" presId="urn:microsoft.com/office/officeart/2005/8/layout/StepDownProcess"/>
     <dgm:cxn modelId="{9B327F3E-71D1-4D16-8F01-1C0C95FD3E92}" type="presOf" srcId="{35AA06C3-8984-486D-BC3B-EC00502C7623}" destId="{E1D218A1-C059-413F-921C-DD036A9C0E50}" srcOrd="0" destOrd="0" presId="urn:microsoft.com/office/officeart/2005/8/layout/StepDownProcess"/>
-    <dgm:cxn modelId="{A3738815-9696-4D90-BAD8-0B9F8580D0E0}" srcId="{159F63B5-CBB3-429E-838F-0034C174C51E}" destId="{27B86D4C-8899-4C39-975A-36EC81AA73DB}" srcOrd="1" destOrd="0" parTransId="{CB82AFFD-AC32-4994-B5FE-40E5E3140BBB}" sibTransId="{14D7742E-DAC2-4237-BF82-1ACAB50D75CA}"/>
-    <dgm:cxn modelId="{3C7B78FB-A54E-46EA-8CC4-2C91F0E00A90}" type="presOf" srcId="{159F63B5-CBB3-429E-838F-0034C174C51E}" destId="{DD48E900-E455-48FE-8B5F-A75547A473AE}" srcOrd="0" destOrd="0" presId="urn:microsoft.com/office/officeart/2005/8/layout/StepDownProcess"/>
-    <dgm:cxn modelId="{BB9D244B-666B-4152-AA78-8C66E3AE5ABA}" srcId="{E451963A-DE2F-45E1-B638-1D73785D3F04}" destId="{35AA06C3-8984-486D-BC3B-EC00502C7623}" srcOrd="2" destOrd="0" parTransId="{6AFDB741-205F-49C6-9483-D1D0FD85B187}" sibTransId="{A438C444-63FD-410B-81D6-23D9CE582028}"/>
-    <dgm:cxn modelId="{594946FB-D96E-420C-860C-38D8F764BCC2}" srcId="{E451963A-DE2F-45E1-B638-1D73785D3F04}" destId="{159F63B5-CBB3-429E-838F-0034C174C51E}" srcOrd="0" destOrd="0" parTransId="{DFF74DB3-0877-45D9-B097-AE98109AD69D}" sibTransId="{FA00A2D1-4EDD-49FA-A401-CDADC73C21D8}"/>
-    <dgm:cxn modelId="{2793E21F-978D-45B5-B0B2-20D177C58557}" type="presOf" srcId="{DF5A3E90-4696-46A9-BD66-BD8ADCF04CFB}" destId="{6E89BA2F-CCE3-48E0-B569-9DEBC2F8EAD9}" srcOrd="0" destOrd="0" presId="urn:microsoft.com/office/officeart/2005/8/layout/StepDownProcess"/>
     <dgm:cxn modelId="{8FB74A12-B0D5-4EF6-8B3C-6B1B5A1D8BF0}" type="presOf" srcId="{EDA0C1EF-723B-4077-903B-5BD3E62F531B}" destId="{82CE622F-54FB-4EFB-BBC4-55DC2A780314}" srcOrd="0" destOrd="0" presId="urn:microsoft.com/office/officeart/2005/8/layout/StepDownProcess"/>
     <dgm:cxn modelId="{7BBDBB13-CCEA-4525-AFFE-B927C8CA0AB3}" srcId="{159F63B5-CBB3-429E-838F-0034C174C51E}" destId="{3708D046-9E3C-4FEF-9CB2-2961D5EB57D1}" srcOrd="0" destOrd="0" parTransId="{7B993A68-D80C-460B-A825-BC4810167A01}" sibTransId="{8F0A3463-A974-4887-84E4-E956ECFEC2CC}"/>
-    <dgm:cxn modelId="{FDB416E6-B93F-4932-8ACF-62D1B8A7F386}" srcId="{35AA06C3-8984-486D-BC3B-EC00502C7623}" destId="{DF5A3E90-4696-46A9-BD66-BD8ADCF04CFB}" srcOrd="0" destOrd="0" parTransId="{089E7FCE-8C4E-4D9A-B374-CC868B6359E3}" sibTransId="{8EF020F2-411F-48EA-B5EA-E45713AB9C65}"/>
-    <dgm:cxn modelId="{F40718B0-42F8-4A8A-B955-0A6C1DF51704}" srcId="{E451963A-DE2F-45E1-B638-1D73785D3F04}" destId="{EDA0C1EF-723B-4077-903B-5BD3E62F531B}" srcOrd="1" destOrd="0" parTransId="{64A6E2B9-7717-411C-BD88-BFF83A12CEF2}" sibTransId="{94EF8850-4C04-4B55-8A66-F900BE881D39}"/>
+    <dgm:cxn modelId="{3C7B78FB-A54E-46EA-8CC4-2C91F0E00A90}" type="presOf" srcId="{159F63B5-CBB3-429E-838F-0034C174C51E}" destId="{DD48E900-E455-48FE-8B5F-A75547A473AE}" srcOrd="0" destOrd="0" presId="urn:microsoft.com/office/officeart/2005/8/layout/StepDownProcess"/>
+    <dgm:cxn modelId="{A3738815-9696-4D90-BAD8-0B9F8580D0E0}" srcId="{159F63B5-CBB3-429E-838F-0034C174C51E}" destId="{27B86D4C-8899-4C39-975A-36EC81AA73DB}" srcOrd="1" destOrd="0" parTransId="{CB82AFFD-AC32-4994-B5FE-40E5E3140BBB}" sibTransId="{14D7742E-DAC2-4237-BF82-1ACAB50D75CA}"/>
+    <dgm:cxn modelId="{2793E21F-978D-45B5-B0B2-20D177C58557}" type="presOf" srcId="{DF5A3E90-4696-46A9-BD66-BD8ADCF04CFB}" destId="{6E89BA2F-CCE3-48E0-B569-9DEBC2F8EAD9}" srcOrd="0" destOrd="0" presId="urn:microsoft.com/office/officeart/2005/8/layout/StepDownProcess"/>
+    <dgm:cxn modelId="{594946FB-D96E-420C-860C-38D8F764BCC2}" srcId="{E451963A-DE2F-45E1-B638-1D73785D3F04}" destId="{159F63B5-CBB3-429E-838F-0034C174C51E}" srcOrd="0" destOrd="0" parTransId="{DFF74DB3-0877-45D9-B097-AE98109AD69D}" sibTransId="{FA00A2D1-4EDD-49FA-A401-CDADC73C21D8}"/>
+    <dgm:cxn modelId="{BB9D244B-666B-4152-AA78-8C66E3AE5ABA}" srcId="{E451963A-DE2F-45E1-B638-1D73785D3F04}" destId="{35AA06C3-8984-486D-BC3B-EC00502C7623}" srcOrd="2" destOrd="0" parTransId="{6AFDB741-205F-49C6-9483-D1D0FD85B187}" sibTransId="{A438C444-63FD-410B-81D6-23D9CE582028}"/>
     <dgm:cxn modelId="{AB57D499-575D-412F-A8F0-FAE879B053C7}" type="presOf" srcId="{E451963A-DE2F-45E1-B638-1D73785D3F04}" destId="{5D2DC6A4-3E67-43DA-BA60-0785C4C46AEB}" srcOrd="0" destOrd="0" presId="urn:microsoft.com/office/officeart/2005/8/layout/StepDownProcess"/>
-    <dgm:cxn modelId="{414B9940-C15B-4D58-8E65-392EB6BA631F}" type="presOf" srcId="{4EA42339-E69B-4AEF-8ACD-CC5DDF7DC5B8}" destId="{52FF9941-5C83-4AA1-9BC2-A25757A7619D}" srcOrd="0" destOrd="0" presId="urn:microsoft.com/office/officeart/2005/8/layout/StepDownProcess"/>
-    <dgm:cxn modelId="{BA78F93A-EEC4-4E1F-A87F-7EE4F6F6CC1A}" type="presOf" srcId="{27B86D4C-8899-4C39-975A-36EC81AA73DB}" destId="{E8045478-C45D-4664-BE67-F4C0E36E70C3}" srcOrd="0" destOrd="1" presId="urn:microsoft.com/office/officeart/2005/8/layout/StepDownProcess"/>
-    <dgm:cxn modelId="{F2999149-6DA8-4EC9-BA95-B8A0939D716B}" type="presOf" srcId="{3708D046-9E3C-4FEF-9CB2-2961D5EB57D1}" destId="{E8045478-C45D-4664-BE67-F4C0E36E70C3}" srcOrd="0" destOrd="0" presId="urn:microsoft.com/office/officeart/2005/8/layout/StepDownProcess"/>
-    <dgm:cxn modelId="{7257EFC0-D5BB-4A88-8424-A555CDBBA981}" srcId="{EDA0C1EF-723B-4077-903B-5BD3E62F531B}" destId="{4EA42339-E69B-4AEF-8ACD-CC5DDF7DC5B8}" srcOrd="0" destOrd="0" parTransId="{613FD060-3A8A-4CBD-A43C-94BDC8219467}" sibTransId="{4D078FCB-9D12-4368-9D31-E3F1AFB1B920}"/>
     <dgm:cxn modelId="{D3FDD567-DA47-4F91-B72B-E28F9C8EB29D}" type="presParOf" srcId="{5D2DC6A4-3E67-43DA-BA60-0785C4C46AEB}" destId="{0D2A96E4-59DB-4B68-9A00-38A487736139}" srcOrd="0" destOrd="0" presId="urn:microsoft.com/office/officeart/2005/8/layout/StepDownProcess"/>
     <dgm:cxn modelId="{B0AAD6FF-8727-4C35-A49F-EF3AAA6E2574}" type="presParOf" srcId="{0D2A96E4-59DB-4B68-9A00-38A487736139}" destId="{2EF2E7EF-A843-4BD1-AB40-0C7DBF413E5A}" srcOrd="0" destOrd="0" presId="urn:microsoft.com/office/officeart/2005/8/layout/StepDownProcess"/>
     <dgm:cxn modelId="{54D3DB4E-6D41-449B-AFA5-9B43EFB0B14E}" type="presParOf" srcId="{0D2A96E4-59DB-4B68-9A00-38A487736139}" destId="{DD48E900-E455-48FE-8B5F-A75547A473AE}" srcOrd="1" destOrd="0" presId="urn:microsoft.com/office/officeart/2005/8/layout/StepDownProcess"/>
@@ -4204,7 +4285,7 @@
 <dgm:dataModel xmlns:dgm="http://schemas.openxmlformats.org/drawingml/2006/diagram" xmlns:a="http://schemas.openxmlformats.org/drawingml/2006/main">
   <dgm:ptLst>
     <dgm:pt modelId="{439E7E43-D39C-7D42-85EA-A751C29430F8}" type="doc">
-      <dgm:prSet loTypeId="urn:microsoft.com/office/officeart/2005/8/layout/arrow2" loCatId="list" qsTypeId="urn:microsoft.com/office/officeart/2005/8/quickstyle/simple4" qsCatId="simple" csTypeId="urn:microsoft.com/office/officeart/2005/8/colors/accent1_2" csCatId="accent1" phldr="1"/>
+      <dgm:prSet loTypeId="urn:microsoft.com/office/officeart/2005/8/layout/arrow2" loCatId="list" qsTypeId="urn:microsoft.com/office/officeart/2005/8/quickstyle/simple4" qsCatId="simple" csTypeId="urn:microsoft.com/office/officeart/2005/8/colors/colorful1" csCatId="colorful" phldr="1"/>
       <dgm:spPr/>
       <dgm:t>
         <a:bodyPr/>
@@ -4224,7 +4305,9 @@
           <a:r>
             <a:rPr lang="en-US" altLang="zh-CN" dirty="0" smtClean="0">
               <a:solidFill>
-                <a:schemeClr val="bg1"/>
+                <a:schemeClr val="accent2">
+                  <a:lumMod val="75000"/>
+                </a:schemeClr>
               </a:solidFill>
             </a:rPr>
             <a:t>update </a:t>
@@ -4232,14 +4315,18 @@
           <a:r>
             <a:rPr lang="en-US" altLang="zh-CN" dirty="0" err="1" smtClean="0">
               <a:solidFill>
-                <a:schemeClr val="bg1"/>
+                <a:schemeClr val="accent2">
+                  <a:lumMod val="75000"/>
+                </a:schemeClr>
               </a:solidFill>
             </a:rPr>
             <a:t>udtm</a:t>
           </a:r>
           <a:endParaRPr lang="zh-CN" altLang="en-US" dirty="0">
             <a:solidFill>
-              <a:schemeClr val="bg1"/>
+              <a:schemeClr val="accent2">
+                <a:lumMod val="75000"/>
+              </a:schemeClr>
             </a:solidFill>
           </a:endParaRPr>
         </a:p>
@@ -4277,14 +4364,18 @@
           <a:r>
             <a:rPr lang="en-US" altLang="zh-CN" dirty="0" smtClean="0">
               <a:solidFill>
-                <a:schemeClr val="bg1"/>
+                <a:schemeClr val="accent2">
+                  <a:lumMod val="75000"/>
+                </a:schemeClr>
               </a:solidFill>
             </a:rPr>
             <a:t>update DB</a:t>
           </a:r>
           <a:endParaRPr lang="zh-CN" altLang="en-US" dirty="0">
             <a:solidFill>
-              <a:schemeClr val="bg1"/>
+              <a:schemeClr val="accent2">
+                <a:lumMod val="75000"/>
+              </a:schemeClr>
             </a:solidFill>
           </a:endParaRPr>
         </a:p>
@@ -4322,7 +4413,9 @@
           <a:r>
             <a:rPr lang="en-US" altLang="zh-CN" dirty="0" err="1" smtClean="0">
               <a:solidFill>
-                <a:schemeClr val="bg1"/>
+                <a:schemeClr val="accent2">
+                  <a:lumMod val="75000"/>
+                </a:schemeClr>
               </a:solidFill>
             </a:rPr>
             <a:t>init</a:t>
@@ -4330,14 +4423,18 @@
           <a:r>
             <a:rPr lang="en-US" altLang="zh-CN" dirty="0" smtClean="0">
               <a:solidFill>
-                <a:schemeClr val="bg1"/>
+                <a:schemeClr val="accent2">
+                  <a:lumMod val="75000"/>
+                </a:schemeClr>
               </a:solidFill>
             </a:rPr>
             <a:t> DB (once)</a:t>
           </a:r>
           <a:endParaRPr lang="zh-CN" altLang="en-US" dirty="0">
             <a:solidFill>
-              <a:schemeClr val="bg1"/>
+              <a:schemeClr val="accent2">
+                <a:lumMod val="75000"/>
+              </a:schemeClr>
             </a:solidFill>
           </a:endParaRPr>
         </a:p>
@@ -4375,14 +4472,18 @@
           <a:r>
             <a:rPr lang="en-US" altLang="zh-CN" dirty="0" smtClean="0">
               <a:solidFill>
-                <a:schemeClr val="bg1"/>
+                <a:schemeClr val="accent2">
+                  <a:lumMod val="75000"/>
+                </a:schemeClr>
               </a:solidFill>
             </a:rPr>
             <a:t>grab query</a:t>
           </a:r>
           <a:endParaRPr lang="zh-CN" altLang="en-US" dirty="0">
             <a:solidFill>
-              <a:schemeClr val="bg1"/>
+              <a:schemeClr val="accent2">
+                <a:lumMod val="75000"/>
+              </a:schemeClr>
             </a:solidFill>
           </a:endParaRPr>
         </a:p>
@@ -4420,7 +4521,9 @@
           <a:r>
             <a:rPr lang="en-US" altLang="zh-CN" dirty="0" smtClean="0">
               <a:solidFill>
-                <a:schemeClr val="bg1"/>
+                <a:schemeClr val="accent2">
+                  <a:lumMod val="75000"/>
+                </a:schemeClr>
               </a:solidFill>
             </a:rPr>
             <a:t>send</a:t>
@@ -4428,7 +4531,9 @@
           <a:r>
             <a:rPr lang="zh-CN" altLang="en-US" dirty="0" smtClean="0">
               <a:solidFill>
-                <a:schemeClr val="bg1"/>
+                <a:schemeClr val="accent2">
+                  <a:lumMod val="75000"/>
+                </a:schemeClr>
               </a:solidFill>
             </a:rPr>
             <a:t> </a:t>
@@ -4436,7 +4541,9 @@
           <a:r>
             <a:rPr lang="en-US" altLang="zh-CN" dirty="0" smtClean="0">
               <a:solidFill>
-                <a:schemeClr val="bg1"/>
+                <a:schemeClr val="accent2">
+                  <a:lumMod val="75000"/>
+                </a:schemeClr>
               </a:solidFill>
             </a:rPr>
             <a:t>email</a:t>
@@ -4444,22 +4551,37 @@
           <a:r>
             <a:rPr lang="zh-CN" altLang="en-US" dirty="0" smtClean="0">
               <a:solidFill>
-                <a:schemeClr val="bg1"/>
+                <a:schemeClr val="accent2">
+                  <a:lumMod val="75000"/>
+                </a:schemeClr>
               </a:solidFill>
             </a:rPr>
             <a:t> </a:t>
           </a:r>
+          <a:endParaRPr lang="en-US" altLang="zh-CN" dirty="0" smtClean="0">
+            <a:solidFill>
+              <a:schemeClr val="accent2">
+                <a:lumMod val="75000"/>
+              </a:schemeClr>
+            </a:solidFill>
+          </a:endParaRPr>
+        </a:p>
+        <a:p>
           <a:r>
             <a:rPr lang="en-US" altLang="zh-CN" dirty="0" smtClean="0">
               <a:solidFill>
-                <a:schemeClr val="bg1"/>
+                <a:schemeClr val="accent2">
+                  <a:lumMod val="75000"/>
+                </a:schemeClr>
               </a:solidFill>
             </a:rPr>
-            <a:t>&amp; display</a:t>
+            <a:t>and display</a:t>
           </a:r>
           <a:endParaRPr lang="zh-CN" altLang="en-US" dirty="0">
             <a:solidFill>
-              <a:schemeClr val="bg1"/>
+              <a:schemeClr val="accent2">
+                <a:lumMod val="75000"/>
+              </a:schemeClr>
             </a:solidFill>
           </a:endParaRPr>
         </a:p>
@@ -4496,24 +4618,46 @@
         </dgm:presLayoutVars>
       </dgm:prSet>
       <dgm:spPr/>
+      <dgm:t>
+        <a:bodyPr/>
+        <a:lstStyle/>
+        <a:p>
+          <a:endParaRPr lang="en-US"/>
+        </a:p>
+      </dgm:t>
     </dgm:pt>
     <dgm:pt modelId="{4B28981D-D0FE-4E41-9517-6A2718775F02}" type="pres">
       <dgm:prSet presAssocID="{439E7E43-D39C-7D42-85EA-A751C29430F8}" presName="arrow" presStyleLbl="bgShp" presStyleIdx="0" presStyleCnt="1"/>
-      <dgm:spPr>
-        <a:solidFill>
-          <a:schemeClr val="tx1">
-            <a:lumMod val="65000"/>
-          </a:schemeClr>
-        </a:solidFill>
-      </dgm:spPr>
+      <dgm:spPr/>
+      <dgm:t>
+        <a:bodyPr/>
+        <a:lstStyle/>
+        <a:p>
+          <a:endParaRPr lang="en-US"/>
+        </a:p>
+      </dgm:t>
     </dgm:pt>
     <dgm:pt modelId="{60CEEA89-CD6E-E645-8565-7F0F9A020D2F}" type="pres">
       <dgm:prSet presAssocID="{439E7E43-D39C-7D42-85EA-A751C29430F8}" presName="arrowDiagram5" presStyleCnt="0"/>
       <dgm:spPr/>
+      <dgm:t>
+        <a:bodyPr/>
+        <a:lstStyle/>
+        <a:p>
+          <a:endParaRPr lang="en-US"/>
+        </a:p>
+      </dgm:t>
     </dgm:pt>
     <dgm:pt modelId="{F4A2CE9E-4F54-2845-A600-F05A606EC992}" type="pres">
       <dgm:prSet presAssocID="{5BDBD8C0-6201-8742-9269-E9516AFF0348}" presName="bullet5a" presStyleLbl="node1" presStyleIdx="0" presStyleCnt="5"/>
       <dgm:spPr/>
+      <dgm:t>
+        <a:bodyPr/>
+        <a:lstStyle/>
+        <a:p>
+          <a:endParaRPr lang="en-US"/>
+        </a:p>
+      </dgm:t>
     </dgm:pt>
     <dgm:pt modelId="{15E52C57-F556-0F49-B2FA-53728AD0B0C5}" type="pres">
       <dgm:prSet presAssocID="{5BDBD8C0-6201-8742-9269-E9516AFF0348}" presName="textBox5a" presStyleLbl="revTx" presStyleIdx="0" presStyleCnt="5">
@@ -4522,10 +4666,24 @@
         </dgm:presLayoutVars>
       </dgm:prSet>
       <dgm:spPr/>
+      <dgm:t>
+        <a:bodyPr/>
+        <a:lstStyle/>
+        <a:p>
+          <a:endParaRPr lang="en-US"/>
+        </a:p>
+      </dgm:t>
     </dgm:pt>
     <dgm:pt modelId="{87186F7C-FC7C-FA47-96EA-CFF81809C066}" type="pres">
       <dgm:prSet presAssocID="{9DA373CA-ABCC-6E48-815A-70A2A1DD2AB5}" presName="bullet5b" presStyleLbl="node1" presStyleIdx="1" presStyleCnt="5"/>
       <dgm:spPr/>
+      <dgm:t>
+        <a:bodyPr/>
+        <a:lstStyle/>
+        <a:p>
+          <a:endParaRPr lang="en-US"/>
+        </a:p>
+      </dgm:t>
     </dgm:pt>
     <dgm:pt modelId="{77F921E8-9275-7143-A538-A3FF9D888409}" type="pres">
       <dgm:prSet presAssocID="{9DA373CA-ABCC-6E48-815A-70A2A1DD2AB5}" presName="textBox5b" presStyleLbl="revTx" presStyleIdx="1" presStyleCnt="5">
@@ -4534,10 +4692,24 @@
         </dgm:presLayoutVars>
       </dgm:prSet>
       <dgm:spPr/>
+      <dgm:t>
+        <a:bodyPr/>
+        <a:lstStyle/>
+        <a:p>
+          <a:endParaRPr lang="en-US"/>
+        </a:p>
+      </dgm:t>
     </dgm:pt>
     <dgm:pt modelId="{58C73B42-291A-F540-8445-9AA79B96D5FC}" type="pres">
       <dgm:prSet presAssocID="{291AC740-C658-5844-B2F3-DBE7DF021A4F}" presName="bullet5c" presStyleLbl="node1" presStyleIdx="2" presStyleCnt="5"/>
       <dgm:spPr/>
+      <dgm:t>
+        <a:bodyPr/>
+        <a:lstStyle/>
+        <a:p>
+          <a:endParaRPr lang="en-US"/>
+        </a:p>
+      </dgm:t>
     </dgm:pt>
     <dgm:pt modelId="{BD02C449-AF21-AA41-BA15-B36034AA8C7F}" type="pres">
       <dgm:prSet presAssocID="{291AC740-C658-5844-B2F3-DBE7DF021A4F}" presName="textBox5c" presStyleLbl="revTx" presStyleIdx="2" presStyleCnt="5">
@@ -4546,10 +4718,24 @@
         </dgm:presLayoutVars>
       </dgm:prSet>
       <dgm:spPr/>
+      <dgm:t>
+        <a:bodyPr/>
+        <a:lstStyle/>
+        <a:p>
+          <a:endParaRPr lang="en-US"/>
+        </a:p>
+      </dgm:t>
     </dgm:pt>
     <dgm:pt modelId="{D8728618-6120-FA47-8853-C631084C3957}" type="pres">
       <dgm:prSet presAssocID="{8A9DBA33-9BEF-034A-980A-B8BE99CDED95}" presName="bullet5d" presStyleLbl="node1" presStyleIdx="3" presStyleCnt="5"/>
       <dgm:spPr/>
+      <dgm:t>
+        <a:bodyPr/>
+        <a:lstStyle/>
+        <a:p>
+          <a:endParaRPr lang="en-US"/>
+        </a:p>
+      </dgm:t>
     </dgm:pt>
     <dgm:pt modelId="{9113C10D-B876-7B49-82BC-5D74C37344CB}" type="pres">
       <dgm:prSet presAssocID="{8A9DBA33-9BEF-034A-980A-B8BE99CDED95}" presName="textBox5d" presStyleLbl="revTx" presStyleIdx="3" presStyleCnt="5">
@@ -4558,13 +4744,27 @@
         </dgm:presLayoutVars>
       </dgm:prSet>
       <dgm:spPr/>
+      <dgm:t>
+        <a:bodyPr/>
+        <a:lstStyle/>
+        <a:p>
+          <a:endParaRPr lang="en-US"/>
+        </a:p>
+      </dgm:t>
     </dgm:pt>
     <dgm:pt modelId="{E8641921-1B96-854B-8188-AD83676FDB22}" type="pres">
       <dgm:prSet presAssocID="{2878907B-A8A6-3944-80AD-4DEAFBA53A55}" presName="bullet5e" presStyleLbl="node1" presStyleIdx="4" presStyleCnt="5"/>
       <dgm:spPr/>
+      <dgm:t>
+        <a:bodyPr/>
+        <a:lstStyle/>
+        <a:p>
+          <a:endParaRPr lang="en-US"/>
+        </a:p>
+      </dgm:t>
     </dgm:pt>
     <dgm:pt modelId="{DFD73A7A-E931-D644-8BFA-53CD5212CD45}" type="pres">
-      <dgm:prSet presAssocID="{2878907B-A8A6-3944-80AD-4DEAFBA53A55}" presName="textBox5e" presStyleLbl="revTx" presStyleIdx="4" presStyleCnt="5">
+      <dgm:prSet presAssocID="{2878907B-A8A6-3944-80AD-4DEAFBA53A55}" presName="textBox5e" presStyleLbl="revTx" presStyleIdx="4" presStyleCnt="5" custScaleX="149111" custScaleY="92777" custLinFactNeighborX="38016" custLinFactNeighborY="0">
         <dgm:presLayoutVars>
           <dgm:bulletEnabled val="1"/>
         </dgm:presLayoutVars>
@@ -4580,17 +4780,17 @@
     </dgm:pt>
   </dgm:ptLst>
   <dgm:cxnLst>
+    <dgm:cxn modelId="{6A3715CB-A21C-7341-97C0-D5FFDCEB8A8D}" srcId="{439E7E43-D39C-7D42-85EA-A751C29430F8}" destId="{2878907B-A8A6-3944-80AD-4DEAFBA53A55}" srcOrd="4" destOrd="0" parTransId="{62C6F2F6-A07E-6448-A6AB-508DF5F4902E}" sibTransId="{CB7EB6A9-6198-EA42-B580-3CD5EBB4C4FA}"/>
+    <dgm:cxn modelId="{EFEB88DC-81E2-7449-8971-03FC12287B16}" type="presOf" srcId="{2878907B-A8A6-3944-80AD-4DEAFBA53A55}" destId="{DFD73A7A-E931-D644-8BFA-53CD5212CD45}" srcOrd="0" destOrd="0" presId="urn:microsoft.com/office/officeart/2005/8/layout/arrow2"/>
+    <dgm:cxn modelId="{45C4F3E0-0CFE-354B-8DF4-6E6CD131EB54}" type="presOf" srcId="{291AC740-C658-5844-B2F3-DBE7DF021A4F}" destId="{BD02C449-AF21-AA41-BA15-B36034AA8C7F}" srcOrd="0" destOrd="0" presId="urn:microsoft.com/office/officeart/2005/8/layout/arrow2"/>
+    <dgm:cxn modelId="{296D46DA-391B-0D40-85BB-4DE1F48A4FA2}" srcId="{439E7E43-D39C-7D42-85EA-A751C29430F8}" destId="{291AC740-C658-5844-B2F3-DBE7DF021A4F}" srcOrd="2" destOrd="0" parTransId="{11848102-F00B-FF47-9834-04D5D6B953F7}" sibTransId="{25373308-4545-C74C-A003-E34A659D3D65}"/>
     <dgm:cxn modelId="{9C783EDB-EC42-784D-9D7E-5738F375F407}" srcId="{439E7E43-D39C-7D42-85EA-A751C29430F8}" destId="{9DA373CA-ABCC-6E48-815A-70A2A1DD2AB5}" srcOrd="1" destOrd="0" parTransId="{78BDD997-F7CE-F447-BF79-4A6CCD7EAC56}" sibTransId="{79371043-C1A8-734F-896D-FBB21C849C1D}"/>
+    <dgm:cxn modelId="{0EFA888E-B8B3-7E41-A209-3AA79608F703}" srcId="{439E7E43-D39C-7D42-85EA-A751C29430F8}" destId="{5BDBD8C0-6201-8742-9269-E9516AFF0348}" srcOrd="0" destOrd="0" parTransId="{700CB5CC-A012-F94F-8DBF-B9E23D1D1BE8}" sibTransId="{31BE372E-020F-A849-B66E-535613CF9061}"/>
     <dgm:cxn modelId="{2D4EA844-27C3-B846-BA3C-5B40F773D3B3}" type="presOf" srcId="{8A9DBA33-9BEF-034A-980A-B8BE99CDED95}" destId="{9113C10D-B876-7B49-82BC-5D74C37344CB}" srcOrd="0" destOrd="0" presId="urn:microsoft.com/office/officeart/2005/8/layout/arrow2"/>
-    <dgm:cxn modelId="{0EFA888E-B8B3-7E41-A209-3AA79608F703}" srcId="{439E7E43-D39C-7D42-85EA-A751C29430F8}" destId="{5BDBD8C0-6201-8742-9269-E9516AFF0348}" srcOrd="0" destOrd="0" parTransId="{700CB5CC-A012-F94F-8DBF-B9E23D1D1BE8}" sibTransId="{31BE372E-020F-A849-B66E-535613CF9061}"/>
-    <dgm:cxn modelId="{C4BB0A93-B954-F048-A540-E43486AF126C}" type="presOf" srcId="{5BDBD8C0-6201-8742-9269-E9516AFF0348}" destId="{15E52C57-F556-0F49-B2FA-53728AD0B0C5}" srcOrd="0" destOrd="0" presId="urn:microsoft.com/office/officeart/2005/8/layout/arrow2"/>
-    <dgm:cxn modelId="{45C4F3E0-0CFE-354B-8DF4-6E6CD131EB54}" type="presOf" srcId="{291AC740-C658-5844-B2F3-DBE7DF021A4F}" destId="{BD02C449-AF21-AA41-BA15-B36034AA8C7F}" srcOrd="0" destOrd="0" presId="urn:microsoft.com/office/officeart/2005/8/layout/arrow2"/>
-    <dgm:cxn modelId="{EFEB88DC-81E2-7449-8971-03FC12287B16}" type="presOf" srcId="{2878907B-A8A6-3944-80AD-4DEAFBA53A55}" destId="{DFD73A7A-E931-D644-8BFA-53CD5212CD45}" srcOrd="0" destOrd="0" presId="urn:microsoft.com/office/officeart/2005/8/layout/arrow2"/>
     <dgm:cxn modelId="{BB6BBB34-FB04-1840-B133-E53D80DD2880}" type="presOf" srcId="{439E7E43-D39C-7D42-85EA-A751C29430F8}" destId="{224EA3E8-239C-0442-BD49-5D5E91452372}" srcOrd="0" destOrd="0" presId="urn:microsoft.com/office/officeart/2005/8/layout/arrow2"/>
-    <dgm:cxn modelId="{6A3715CB-A21C-7341-97C0-D5FFDCEB8A8D}" srcId="{439E7E43-D39C-7D42-85EA-A751C29430F8}" destId="{2878907B-A8A6-3944-80AD-4DEAFBA53A55}" srcOrd="4" destOrd="0" parTransId="{62C6F2F6-A07E-6448-A6AB-508DF5F4902E}" sibTransId="{CB7EB6A9-6198-EA42-B580-3CD5EBB4C4FA}"/>
-    <dgm:cxn modelId="{296D46DA-391B-0D40-85BB-4DE1F48A4FA2}" srcId="{439E7E43-D39C-7D42-85EA-A751C29430F8}" destId="{291AC740-C658-5844-B2F3-DBE7DF021A4F}" srcOrd="2" destOrd="0" parTransId="{11848102-F00B-FF47-9834-04D5D6B953F7}" sibTransId="{25373308-4545-C74C-A003-E34A659D3D65}"/>
     <dgm:cxn modelId="{EBD2A2EF-CFFA-BF4F-A7B9-4B839FC923AF}" srcId="{439E7E43-D39C-7D42-85EA-A751C29430F8}" destId="{8A9DBA33-9BEF-034A-980A-B8BE99CDED95}" srcOrd="3" destOrd="0" parTransId="{A13F9803-3248-814B-A801-00C6A8A40121}" sibTransId="{0B457B8E-349D-3F41-85B4-103E24247DCC}"/>
     <dgm:cxn modelId="{2720C664-3059-6A41-BAEF-636475ED848E}" type="presOf" srcId="{9DA373CA-ABCC-6E48-815A-70A2A1DD2AB5}" destId="{77F921E8-9275-7143-A538-A3FF9D888409}" srcOrd="0" destOrd="0" presId="urn:microsoft.com/office/officeart/2005/8/layout/arrow2"/>
+    <dgm:cxn modelId="{C4BB0A93-B954-F048-A540-E43486AF126C}" type="presOf" srcId="{5BDBD8C0-6201-8742-9269-E9516AFF0348}" destId="{15E52C57-F556-0F49-B2FA-53728AD0B0C5}" srcOrd="0" destOrd="0" presId="urn:microsoft.com/office/officeart/2005/8/layout/arrow2"/>
     <dgm:cxn modelId="{FC0BB0B9-9971-7549-A1C8-12AF30FC75F8}" type="presParOf" srcId="{224EA3E8-239C-0442-BD49-5D5E91452372}" destId="{4B28981D-D0FE-4E41-9517-6A2718775F02}" srcOrd="0" destOrd="0" presId="urn:microsoft.com/office/officeart/2005/8/layout/arrow2"/>
     <dgm:cxn modelId="{A613756C-E4FC-824C-96F1-8217A45970FD}" type="presParOf" srcId="{224EA3E8-239C-0442-BD49-5D5E91452372}" destId="{60CEEA89-CD6E-E645-8565-7F0F9A020D2F}" srcOrd="1" destOrd="0" presId="urn:microsoft.com/office/officeart/2005/8/layout/arrow2"/>
     <dgm:cxn modelId="{9373390F-3420-E34C-903D-61B58E1122DF}" type="presParOf" srcId="{60CEEA89-CD6E-E645-8565-7F0F9A020D2F}" destId="{F4A2CE9E-4F54-2845-A600-F05A606EC992}" srcOrd="0" destOrd="0" presId="urn:microsoft.com/office/officeart/2005/8/layout/arrow2"/>
@@ -4846,44 +5046,7 @@
                 <a:lin ang="5400000" scaled="1"/>
               </a:gradFill>
             </a:rPr>
-            <a:t>How do we triage bugs and track </a:t>
-          </a:r>
-          <a:r>
-            <a:rPr lang="en-US" sz="2300" kern="1200" dirty="0" smtClean="0">
-              <a:ln>
-                <a:noFill/>
-              </a:ln>
-              <a:gradFill>
-                <a:gsLst>
-                  <a:gs pos="0">
-                    <a:schemeClr val="accent1">
-                      <a:lumMod val="5000"/>
-                      <a:lumOff val="95000"/>
-                    </a:schemeClr>
-                  </a:gs>
-                  <a:gs pos="74000">
-                    <a:schemeClr val="accent1">
-                      <a:lumMod val="45000"/>
-                      <a:lumOff val="55000"/>
-                    </a:schemeClr>
-                  </a:gs>
-                  <a:gs pos="83000">
-                    <a:schemeClr val="accent1">
-                      <a:lumMod val="45000"/>
-                      <a:lumOff val="55000"/>
-                    </a:schemeClr>
-                  </a:gs>
-                  <a:gs pos="100000">
-                    <a:schemeClr val="accent1">
-                      <a:lumMod val="30000"/>
-                      <a:lumOff val="70000"/>
-                    </a:schemeClr>
-                  </a:gs>
-                </a:gsLst>
-                <a:lin ang="5400000" scaled="1"/>
-              </a:gradFill>
-            </a:rPr>
-            <a:t>them</a:t>
+            <a:t>How do we triage bugs and track them</a:t>
           </a:r>
           <a:r>
             <a:rPr lang="zh-CN" altLang="en-US" sz="2300" kern="1200" dirty="0" smtClean="0">
@@ -5224,7 +5387,7 @@
                 <a:lin ang="5400000" scaled="1"/>
               </a:gradFill>
             </a:rPr>
-            <a:t>Modules</a:t>
+            <a:t>Workflow</a:t>
           </a:r>
           <a:endParaRPr lang="en-US" sz="2300" kern="1200" dirty="0">
             <a:ln>
@@ -5309,7 +5472,7 @@
                 <a:lin ang="5400000" scaled="1"/>
               </a:gradFill>
             </a:rPr>
-            <a:t>Workflow</a:t>
+            <a:t>Modules</a:t>
           </a:r>
           <a:endParaRPr lang="en-US" sz="2300" kern="1200" dirty="0">
             <a:ln>
@@ -5534,7 +5697,7 @@
                 <a:lin ang="5400000" scaled="1"/>
               </a:gradFill>
             </a:rPr>
-            <a:t>Suggestions</a:t>
+            <a:t>Known issues</a:t>
           </a:r>
           <a:endParaRPr lang="en-US" sz="3000" kern="1200" dirty="0">
             <a:ln>
@@ -5702,7 +5865,15 @@
           </a:pPr>
           <a:r>
             <a:rPr lang="en-US" sz="2400" kern="1200" dirty="0" smtClean="0"/>
-            <a:t> bug</a:t>
+            <a:t> </a:t>
+          </a:r>
+          <a:r>
+            <a:rPr lang="en-US" sz="2400" kern="1200" dirty="0" smtClean="0">
+              <a:solidFill>
+                <a:srgbClr val="FFFF00"/>
+              </a:solidFill>
+            </a:rPr>
+            <a:t>bug</a:t>
           </a:r>
         </a:p>
         <a:p>
@@ -5801,7 +5972,11 @@
             <a:rPr lang="en-US" sz="2000" kern="1200" dirty="0" smtClean="0">
               <a:hlinkClick xmlns:r="http://schemas.openxmlformats.org/officeDocument/2006/relationships" r:id="rId1"/>
             </a:rPr>
-            <a:t>triagingBugsLink</a:t>
+            <a:t>Triaging</a:t>
+          </a:r>
+          <a:r>
+            <a:rPr lang="en-US" sz="2000" kern="1200" dirty="0" smtClean="0"/>
+            <a:t>  Bugs, filters incoming bugs</a:t>
           </a:r>
           <a:endParaRPr lang="en-US" sz="2000" kern="1200" dirty="0"/>
         </a:p>
@@ -5946,8 +6121,8 @@
       </dsp:nvSpPr>
       <dsp:spPr>
         <a:xfrm>
-          <a:off x="4809243" y="1604967"/>
-          <a:ext cx="4158970" cy="1032550"/>
+          <a:off x="4681984" y="1600196"/>
+          <a:ext cx="4701087" cy="1032550"/>
         </a:xfrm>
         <a:prstGeom prst="rect">
           <a:avLst/>
@@ -6004,8 +6179,8 @@
         </a:p>
       </dsp:txBody>
       <dsp:txXfrm>
-        <a:off x="4809243" y="1604967"/>
-        <a:ext cx="4158970" cy="1032550"/>
+        <a:off x="4681984" y="1600196"/>
+        <a:ext cx="4701087" cy="1032550"/>
       </dsp:txXfrm>
     </dsp:sp>
     <dsp:sp modelId="{E1D218A1-C059-413F-921C-DD036A9C0E50}">
@@ -6174,7 +6349,7 @@
       </dsp:nvSpPr>
       <dsp:spPr>
         <a:xfrm>
-          <a:off x="1115377" y="0"/>
+          <a:off x="950531" y="0"/>
           <a:ext cx="6713219" cy="4195762"/>
         </a:xfrm>
         <a:prstGeom prst="swooshArrow">
@@ -6184,8 +6359,12 @@
           </a:avLst>
         </a:prstGeom>
         <a:solidFill>
-          <a:schemeClr val="tx1">
-            <a:lumMod val="65000"/>
+          <a:schemeClr val="accent2">
+            <a:tint val="40000"/>
+            <a:hueOff val="0"/>
+            <a:satOff val="0"/>
+            <a:lumOff val="0"/>
+            <a:alphaOff val="0"/>
           </a:schemeClr>
         </a:solidFill>
         <a:ln>
@@ -6219,7 +6398,7 @@
       </dsp:nvSpPr>
       <dsp:spPr>
         <a:xfrm>
-          <a:off x="1776629" y="3119968"/>
+          <a:off x="1611783" y="3119968"/>
           <a:ext cx="154404" cy="154404"/>
         </a:xfrm>
         <a:prstGeom prst="ellipse">
@@ -6228,7 +6407,7 @@
         <a:gradFill rotWithShape="0">
           <a:gsLst>
             <a:gs pos="0">
-              <a:schemeClr val="accent1">
+              <a:schemeClr val="accent2">
                 <a:hueOff val="0"/>
                 <a:satOff val="0"/>
                 <a:lumOff val="0"/>
@@ -6238,7 +6417,7 @@
               </a:schemeClr>
             </a:gs>
             <a:gs pos="100000">
-              <a:schemeClr val="accent1">
+              <a:schemeClr val="accent2">
                 <a:hueOff val="0"/>
                 <a:satOff val="0"/>
                 <a:lumOff val="0"/>
@@ -6283,7 +6462,7 @@
       </dsp:nvSpPr>
       <dsp:spPr>
         <a:xfrm>
-          <a:off x="1853832" y="3197170"/>
+          <a:off x="1688985" y="3197170"/>
           <a:ext cx="879431" cy="998591"/>
         </a:xfrm>
         <a:prstGeom prst="rect">
@@ -6327,7 +6506,9 @@
           <a:r>
             <a:rPr lang="en-US" altLang="zh-CN" sz="2100" kern="1200" dirty="0" err="1" smtClean="0">
               <a:solidFill>
-                <a:schemeClr val="bg1"/>
+                <a:schemeClr val="accent2">
+                  <a:lumMod val="75000"/>
+                </a:schemeClr>
               </a:solidFill>
             </a:rPr>
             <a:t>init</a:t>
@@ -6335,20 +6516,24 @@
           <a:r>
             <a:rPr lang="en-US" altLang="zh-CN" sz="2100" kern="1200" dirty="0" smtClean="0">
               <a:solidFill>
-                <a:schemeClr val="bg1"/>
+                <a:schemeClr val="accent2">
+                  <a:lumMod val="75000"/>
+                </a:schemeClr>
               </a:solidFill>
             </a:rPr>
             <a:t> DB (once)</a:t>
           </a:r>
           <a:endParaRPr lang="zh-CN" altLang="en-US" sz="2100" kern="1200" dirty="0">
             <a:solidFill>
-              <a:schemeClr val="bg1"/>
+              <a:schemeClr val="accent2">
+                <a:lumMod val="75000"/>
+              </a:schemeClr>
             </a:solidFill>
           </a:endParaRPr>
         </a:p>
       </dsp:txBody>
       <dsp:txXfrm>
-        <a:off x="1853832" y="3197170"/>
+        <a:off x="1688985" y="3197170"/>
         <a:ext cx="879431" cy="998591"/>
       </dsp:txXfrm>
     </dsp:sp>
@@ -6359,7 +6544,7 @@
       </dsp:nvSpPr>
       <dsp:spPr>
         <a:xfrm>
-          <a:off x="2612425" y="2316899"/>
+          <a:off x="2447579" y="2316899"/>
           <a:ext cx="241675" cy="241675"/>
         </a:xfrm>
         <a:prstGeom prst="ellipse">
@@ -6368,7 +6553,7 @@
         <a:gradFill rotWithShape="0">
           <a:gsLst>
             <a:gs pos="0">
-              <a:schemeClr val="accent1">
+              <a:schemeClr val="accent3">
                 <a:hueOff val="0"/>
                 <a:satOff val="0"/>
                 <a:lumOff val="0"/>
@@ -6378,7 +6563,7 @@
               </a:schemeClr>
             </a:gs>
             <a:gs pos="100000">
-              <a:schemeClr val="accent1">
+              <a:schemeClr val="accent3">
                 <a:hueOff val="0"/>
                 <a:satOff val="0"/>
                 <a:lumOff val="0"/>
@@ -6423,7 +6608,7 @@
       </dsp:nvSpPr>
       <dsp:spPr>
         <a:xfrm>
-          <a:off x="2733263" y="2437737"/>
+          <a:off x="2568417" y="2437737"/>
           <a:ext cx="1114394" cy="1758024"/>
         </a:xfrm>
         <a:prstGeom prst="rect">
@@ -6467,7 +6652,9 @@
           <a:r>
             <a:rPr lang="en-US" altLang="zh-CN" sz="2100" kern="1200" dirty="0" smtClean="0">
               <a:solidFill>
-                <a:schemeClr val="bg1"/>
+                <a:schemeClr val="accent2">
+                  <a:lumMod val="75000"/>
+                </a:schemeClr>
               </a:solidFill>
             </a:rPr>
             <a:t>update </a:t>
@@ -6475,20 +6662,24 @@
           <a:r>
             <a:rPr lang="en-US" altLang="zh-CN" sz="2100" kern="1200" dirty="0" err="1" smtClean="0">
               <a:solidFill>
-                <a:schemeClr val="bg1"/>
+                <a:schemeClr val="accent2">
+                  <a:lumMod val="75000"/>
+                </a:schemeClr>
               </a:solidFill>
             </a:rPr>
             <a:t>udtm</a:t>
           </a:r>
           <a:endParaRPr lang="zh-CN" altLang="en-US" sz="2100" kern="1200" dirty="0">
             <a:solidFill>
-              <a:schemeClr val="bg1"/>
+              <a:schemeClr val="accent2">
+                <a:lumMod val="75000"/>
+              </a:schemeClr>
             </a:solidFill>
           </a:endParaRPr>
         </a:p>
       </dsp:txBody>
       <dsp:txXfrm>
-        <a:off x="2733263" y="2437737"/>
+        <a:off x="2568417" y="2437737"/>
         <a:ext cx="1114394" cy="1758024"/>
       </dsp:txXfrm>
     </dsp:sp>
@@ -6499,7 +6690,7 @@
       </dsp:nvSpPr>
       <dsp:spPr>
         <a:xfrm>
-          <a:off x="3686540" y="1676626"/>
+          <a:off x="3521694" y="1676626"/>
           <a:ext cx="322234" cy="322234"/>
         </a:xfrm>
         <a:prstGeom prst="ellipse">
@@ -6508,7 +6699,7 @@
         <a:gradFill rotWithShape="0">
           <a:gsLst>
             <a:gs pos="0">
-              <a:schemeClr val="accent1">
+              <a:schemeClr val="accent4">
                 <a:hueOff val="0"/>
                 <a:satOff val="0"/>
                 <a:lumOff val="0"/>
@@ -6518,7 +6709,7 @@
               </a:schemeClr>
             </a:gs>
             <a:gs pos="100000">
-              <a:schemeClr val="accent1">
+              <a:schemeClr val="accent4">
                 <a:hueOff val="0"/>
                 <a:satOff val="0"/>
                 <a:lumOff val="0"/>
@@ -6563,7 +6754,7 @@
       </dsp:nvSpPr>
       <dsp:spPr>
         <a:xfrm>
-          <a:off x="3847658" y="1837743"/>
+          <a:off x="3682811" y="1837743"/>
           <a:ext cx="1295651" cy="2358018"/>
         </a:xfrm>
         <a:prstGeom prst="rect">
@@ -6607,20 +6798,24 @@
           <a:r>
             <a:rPr lang="en-US" altLang="zh-CN" sz="2100" kern="1200" dirty="0" smtClean="0">
               <a:solidFill>
-                <a:schemeClr val="bg1"/>
+                <a:schemeClr val="accent2">
+                  <a:lumMod val="75000"/>
+                </a:schemeClr>
               </a:solidFill>
             </a:rPr>
             <a:t>update DB</a:t>
           </a:r>
           <a:endParaRPr lang="zh-CN" altLang="en-US" sz="2100" kern="1200" dirty="0">
             <a:solidFill>
-              <a:schemeClr val="bg1"/>
+              <a:schemeClr val="accent2">
+                <a:lumMod val="75000"/>
+              </a:schemeClr>
             </a:solidFill>
           </a:endParaRPr>
         </a:p>
       </dsp:txBody>
       <dsp:txXfrm>
-        <a:off x="3847658" y="1837743"/>
+        <a:off x="3682811" y="1837743"/>
         <a:ext cx="1295651" cy="2358018"/>
       </dsp:txXfrm>
     </dsp:sp>
@@ -6631,7 +6826,7 @@
       </dsp:nvSpPr>
       <dsp:spPr>
         <a:xfrm>
-          <a:off x="4935199" y="1176491"/>
+          <a:off x="4770353" y="1176491"/>
           <a:ext cx="416219" cy="416219"/>
         </a:xfrm>
         <a:prstGeom prst="ellipse">
@@ -6640,7 +6835,7 @@
         <a:gradFill rotWithShape="0">
           <a:gsLst>
             <a:gs pos="0">
-              <a:schemeClr val="accent1">
+              <a:schemeClr val="accent5">
                 <a:hueOff val="0"/>
                 <a:satOff val="0"/>
                 <a:lumOff val="0"/>
@@ -6650,7 +6845,7 @@
               </a:schemeClr>
             </a:gs>
             <a:gs pos="100000">
-              <a:schemeClr val="accent1">
+              <a:schemeClr val="accent5">
                 <a:hueOff val="0"/>
                 <a:satOff val="0"/>
                 <a:lumOff val="0"/>
@@ -6695,7 +6890,7 @@
       </dsp:nvSpPr>
       <dsp:spPr>
         <a:xfrm>
-          <a:off x="5143309" y="1384601"/>
+          <a:off x="4978462" y="1384601"/>
           <a:ext cx="1342643" cy="2811160"/>
         </a:xfrm>
         <a:prstGeom prst="rect">
@@ -6739,20 +6934,24 @@
           <a:r>
             <a:rPr lang="en-US" altLang="zh-CN" sz="2100" kern="1200" dirty="0" smtClean="0">
               <a:solidFill>
-                <a:schemeClr val="bg1"/>
+                <a:schemeClr val="accent2">
+                  <a:lumMod val="75000"/>
+                </a:schemeClr>
               </a:solidFill>
             </a:rPr>
             <a:t>grab query</a:t>
           </a:r>
           <a:endParaRPr lang="zh-CN" altLang="en-US" sz="2100" kern="1200" dirty="0">
             <a:solidFill>
-              <a:schemeClr val="bg1"/>
+              <a:schemeClr val="accent2">
+                <a:lumMod val="75000"/>
+              </a:schemeClr>
             </a:solidFill>
           </a:endParaRPr>
         </a:p>
       </dsp:txBody>
       <dsp:txXfrm>
-        <a:off x="5143309" y="1384601"/>
+        <a:off x="4978462" y="1384601"/>
         <a:ext cx="1342643" cy="2811160"/>
       </dsp:txXfrm>
     </dsp:sp>
@@ -6763,7 +6962,7 @@
       </dsp:nvSpPr>
       <dsp:spPr>
         <a:xfrm>
-          <a:off x="6220781" y="842509"/>
+          <a:off x="6055934" y="842509"/>
           <a:ext cx="530344" cy="530344"/>
         </a:xfrm>
         <a:prstGeom prst="ellipse">
@@ -6772,7 +6971,7 @@
         <a:gradFill rotWithShape="0">
           <a:gsLst>
             <a:gs pos="0">
-              <a:schemeClr val="accent1">
+              <a:schemeClr val="accent6">
                 <a:hueOff val="0"/>
                 <a:satOff val="0"/>
                 <a:lumOff val="0"/>
@@ -6782,7 +6981,7 @@
               </a:schemeClr>
             </a:gs>
             <a:gs pos="100000">
-              <a:schemeClr val="accent1">
+              <a:schemeClr val="accent6">
                 <a:hueOff val="0"/>
                 <a:satOff val="0"/>
                 <a:lumOff val="0"/>
@@ -6827,8 +7026,8 @@
       </dsp:nvSpPr>
       <dsp:spPr>
         <a:xfrm>
-          <a:off x="6485953" y="1107681"/>
-          <a:ext cx="1342643" cy="3088080"/>
+          <a:off x="6501833" y="1219207"/>
+          <a:ext cx="2002029" cy="2865028"/>
         </a:xfrm>
         <a:prstGeom prst="rect">
           <a:avLst/>
@@ -6871,7 +7070,9 @@
           <a:r>
             <a:rPr lang="en-US" altLang="zh-CN" sz="2100" kern="1200" dirty="0" smtClean="0">
               <a:solidFill>
-                <a:schemeClr val="bg1"/>
+                <a:schemeClr val="accent2">
+                  <a:lumMod val="75000"/>
+                </a:schemeClr>
               </a:solidFill>
             </a:rPr>
             <a:t>send</a:t>
@@ -6879,7 +7080,9 @@
           <a:r>
             <a:rPr lang="zh-CN" altLang="en-US" sz="2100" kern="1200" dirty="0" smtClean="0">
               <a:solidFill>
-                <a:schemeClr val="bg1"/>
+                <a:schemeClr val="accent2">
+                  <a:lumMod val="75000"/>
+                </a:schemeClr>
               </a:solidFill>
             </a:rPr>
             <a:t> </a:t>
@@ -6887,7 +7090,9 @@
           <a:r>
             <a:rPr lang="en-US" altLang="zh-CN" sz="2100" kern="1200" dirty="0" smtClean="0">
               <a:solidFill>
-                <a:schemeClr val="bg1"/>
+                <a:schemeClr val="accent2">
+                  <a:lumMod val="75000"/>
+                </a:schemeClr>
               </a:solidFill>
             </a:rPr>
             <a:t>email</a:t>
@@ -6895,29 +7100,55 @@
           <a:r>
             <a:rPr lang="zh-CN" altLang="en-US" sz="2100" kern="1200" dirty="0" smtClean="0">
               <a:solidFill>
-                <a:schemeClr val="bg1"/>
+                <a:schemeClr val="accent2">
+                  <a:lumMod val="75000"/>
+                </a:schemeClr>
               </a:solidFill>
             </a:rPr>
             <a:t> </a:t>
           </a:r>
+          <a:endParaRPr lang="en-US" altLang="zh-CN" sz="2100" kern="1200" dirty="0" smtClean="0">
+            <a:solidFill>
+              <a:schemeClr val="accent2">
+                <a:lumMod val="75000"/>
+              </a:schemeClr>
+            </a:solidFill>
+          </a:endParaRPr>
+        </a:p>
+        <a:p>
+          <a:pPr lvl="0" algn="l" defTabSz="933450">
+            <a:lnSpc>
+              <a:spcPct val="90000"/>
+            </a:lnSpc>
+            <a:spcBef>
+              <a:spcPct val="0"/>
+            </a:spcBef>
+            <a:spcAft>
+              <a:spcPct val="35000"/>
+            </a:spcAft>
+          </a:pPr>
           <a:r>
             <a:rPr lang="en-US" altLang="zh-CN" sz="2100" kern="1200" dirty="0" smtClean="0">
               <a:solidFill>
-                <a:schemeClr val="bg1"/>
+                <a:schemeClr val="accent2">
+                  <a:lumMod val="75000"/>
+                </a:schemeClr>
               </a:solidFill>
             </a:rPr>
-            <a:t>&amp; display</a:t>
+            <a:t>and display</a:t>
           </a:r>
           <a:endParaRPr lang="zh-CN" altLang="en-US" sz="2100" kern="1200" dirty="0">
             <a:solidFill>
-              <a:schemeClr val="bg1"/>
+              <a:schemeClr val="accent2">
+                <a:lumMod val="75000"/>
+              </a:schemeClr>
             </a:solidFill>
           </a:endParaRPr>
         </a:p>
       </dsp:txBody>
       <dsp:txXfrm>
-        <a:off x="6485953" y="1107681"/>
-        <a:ext cx="1342643" cy="3088080"/>
+        <a:off x="6501833" y="1219207"/>
+        <a:ext cx="2002029" cy="2865028"/>
       </dsp:txXfrm>
     </dsp:sp>
   </dsp:spTree>
@@ -12239,7 +12470,7 @@
             <a:fld id="{FB004553-04C5-4BB3-AD4E-8B2EF3CDDAF9}" type="datetimeFigureOut">
               <a:rPr lang="en-US" smtClean="0"/>
               <a:pPr/>
-              <a:t>3/15/17</a:t>
+              <a:t>5/12/2017</a:t>
             </a:fld>
             <a:endParaRPr lang="en-US" dirty="0"/>
           </a:p>
@@ -12406,7 +12637,7 @@
             <a:fld id="{3CB6F0DB-E055-41D0-9102-627A646E4242}" type="datetimeFigureOut">
               <a:rPr lang="en-US" smtClean="0"/>
               <a:pPr/>
-              <a:t>3/15/17</a:t>
+              <a:t>5/12/2017</a:t>
             </a:fld>
             <a:endParaRPr lang="en-US" dirty="0"/>
           </a:p>
@@ -14962,7 +15193,7 @@
           <a:p>
             <a:fld id="{4AAD347D-5ACD-4C99-B74B-A9C85AD731AF}" type="datetimeFigureOut">
               <a:rPr lang="en-US" dirty="0"/>
-              <a:t>3/15/17</a:t>
+              <a:t>5/12/2017</a:t>
             </a:fld>
             <a:endParaRPr lang="en-US" dirty="0"/>
           </a:p>
@@ -15599,7 +15830,7 @@
           <a:p>
             <a:fld id="{9796027F-7875-4030-9381-8BD8C4F21935}" type="datetimeFigureOut">
               <a:rPr lang="en-US" dirty="0"/>
-              <a:t>3/15/17</a:t>
+              <a:t>5/12/2017</a:t>
             </a:fld>
             <a:endParaRPr lang="en-US" dirty="0"/>
           </a:p>
@@ -24947,7 +25178,7 @@
           <a:p>
             <a:r>
               <a:rPr lang="en-US" dirty="0" smtClean="0"/>
-              <a:t>A system to help with triage PR and track triage history</a:t>
+              <a:t>A system to help TO triage PR and track triage history</a:t>
             </a:r>
           </a:p>
         </p:txBody>
@@ -25273,31 +25504,7 @@
             </a:r>
             <a:r>
               <a:rPr lang="en-US" altLang="zh-CN" dirty="0" smtClean="0"/>
-              <a:t>2</a:t>
-            </a:r>
-            <a:r>
-              <a:rPr lang="zh-CN" altLang="en-US" dirty="0" smtClean="0"/>
-              <a:t> </a:t>
-            </a:r>
-            <a:r>
-              <a:rPr lang="en-US" altLang="zh-CN" dirty="0" smtClean="0"/>
-              <a:t>parts</a:t>
-            </a:r>
-            <a:r>
-              <a:rPr lang="zh-CN" altLang="en-US" dirty="0" smtClean="0"/>
-              <a:t> </a:t>
-            </a:r>
-            <a:r>
-              <a:rPr lang="en-US" altLang="zh-CN" dirty="0" smtClean="0"/>
-              <a:t>of</a:t>
-            </a:r>
-            <a:r>
-              <a:rPr lang="zh-CN" altLang="en-US" dirty="0" smtClean="0"/>
-              <a:t> </a:t>
-            </a:r>
-            <a:r>
-              <a:rPr lang="en-US" altLang="zh-CN" dirty="0" smtClean="0"/>
-              <a:t>information</a:t>
+              <a:t>some information</a:t>
             </a:r>
             <a:endParaRPr lang="zh-CN" altLang="en-US" dirty="0" smtClean="0"/>
           </a:p>
@@ -25472,6 +25679,10 @@
               <a:buFont typeface="Wingdings" charset="2"/>
               <a:buChar char="Ø"/>
             </a:pPr>
+            <a:r>
+              <a:rPr lang="en-US" altLang="zh-CN" dirty="0" smtClean="0"/>
+              <a:t>Some statistics of the triaged bugs</a:t>
+            </a:r>
             <a:endParaRPr lang="zh-CN" altLang="en-US" dirty="0"/>
           </a:p>
           <a:p>
@@ -25765,7 +25976,7 @@
             </a:r>
             <a:r>
               <a:rPr lang="en-US" altLang="zh-CN" dirty="0" smtClean="0"/>
-              <a:t>thing</a:t>
+              <a:t>triage things</a:t>
             </a:r>
             <a:r>
               <a:rPr lang="zh-CN" altLang="en-US" dirty="0" smtClean="0"/>
@@ -25896,7 +26107,11 @@
             </a:r>
             <a:r>
               <a:rPr lang="en-US" altLang="zh-CN" dirty="0" smtClean="0"/>
-              <a:t>‘nominated</a:t>
+              <a:t>‘</a:t>
+            </a:r>
+            <a:r>
+              <a:rPr lang="en-US" altLang="zh-CN" dirty="0" smtClean="0"/>
+              <a:t>nominate’</a:t>
             </a:r>
             <a:r>
               <a:rPr lang="zh-CN" altLang="en-US" dirty="0" smtClean="0"/>
@@ -26249,15 +26464,15 @@
             </a:r>
             <a:r>
               <a:rPr lang="en-US" altLang="zh-CN" dirty="0" smtClean="0"/>
-              <a:t>that</a:t>
-            </a:r>
-            <a:r>
-              <a:rPr lang="zh-CN" altLang="en-US" dirty="0"/>
+              <a:t>a</a:t>
+            </a:r>
+            <a:r>
+              <a:rPr lang="zh-CN" altLang="en-US" dirty="0" smtClean="0"/>
               <a:t> </a:t>
             </a:r>
             <a:r>
               <a:rPr lang="en-US" altLang="zh-CN" dirty="0" smtClean="0"/>
-              <a:t>timeliness.</a:t>
+              <a:t>high timeliness job.</a:t>
             </a:r>
             <a:endParaRPr lang="zh-CN" altLang="en-US" dirty="0" smtClean="0"/>
           </a:p>
@@ -26487,7 +26702,7 @@
             </a:r>
             <a:r>
               <a:rPr lang="en-US" altLang="zh-CN" dirty="0" smtClean="0"/>
-              <a:t>like</a:t>
+              <a:t>like to</a:t>
             </a:r>
             <a:r>
               <a:rPr lang="zh-CN" altLang="en-US" dirty="0" smtClean="0"/>
@@ -26520,14 +26735,6 @@
             <a:r>
               <a:rPr lang="en-US" altLang="zh-CN" dirty="0" smtClean="0"/>
               <a:t>the</a:t>
-            </a:r>
-            <a:r>
-              <a:rPr lang="zh-CN" altLang="en-US" dirty="0" smtClean="0"/>
-              <a:t> </a:t>
-            </a:r>
-            <a:r>
-              <a:rPr lang="en-US" altLang="zh-CN" dirty="0" smtClean="0"/>
-              <a:t>purple</a:t>
             </a:r>
             <a:r>
               <a:rPr lang="zh-CN" altLang="en-US" dirty="0" smtClean="0"/>
@@ -26706,7 +26913,7 @@
             </a:r>
             <a:r>
               <a:rPr lang="en-US" altLang="zh-CN" dirty="0" smtClean="0"/>
-              <a:t>pay</a:t>
+              <a:t>to pay</a:t>
             </a:r>
             <a:r>
               <a:rPr lang="zh-CN" altLang="en-US" dirty="0" smtClean="0"/>
@@ -26731,14 +26938,6 @@
             <a:r>
               <a:rPr lang="en-US" altLang="zh-CN" dirty="0" smtClean="0"/>
               <a:t>the</a:t>
-            </a:r>
-            <a:r>
-              <a:rPr lang="zh-CN" altLang="en-US" dirty="0" smtClean="0"/>
-              <a:t> </a:t>
-            </a:r>
-            <a:r>
-              <a:rPr lang="en-US" altLang="zh-CN" dirty="0" smtClean="0"/>
-              <a:t>yellow</a:t>
             </a:r>
             <a:r>
               <a:rPr lang="zh-CN" altLang="en-US" dirty="0" smtClean="0"/>
@@ -27170,7 +27369,11 @@
           <a:p>
             <a:r>
               <a:rPr lang="en-US" altLang="zh-CN" dirty="0" smtClean="0"/>
-              <a:t>Suggestions</a:t>
+              <a:t>Known issues</a:t>
+            </a:r>
+            <a:r>
+              <a:rPr lang="en-US" altLang="zh-CN" dirty="0" smtClean="0"/>
+              <a:t/>
             </a:r>
             <a:br>
               <a:rPr lang="en-US" altLang="zh-CN" dirty="0" smtClean="0"/>
@@ -27241,7 +27444,7 @@
         <p:spPr>
           <a:xfrm>
             <a:off x="1903412" y="2209800"/>
-            <a:ext cx="5943600" cy="369332"/>
+            <a:ext cx="7696200" cy="1200329"/>
           </a:xfrm>
           <a:prstGeom prst="rect">
             <a:avLst/>
@@ -27254,50 +27457,28 @@
           </a:bodyPr>
           <a:lstStyle/>
           <a:p>
+            <a:pPr marL="285750" indent="-285750">
+              <a:buFont typeface="Wingdings" panose="05000000000000000000" pitchFamily="2" charset="2"/>
+              <a:buChar char="v"/>
+            </a:pPr>
             <a:r>
               <a:rPr lang="en-US" altLang="zh-CN" dirty="0" smtClean="0"/>
-              <a:t>Please</a:t>
-            </a:r>
-            <a:r>
-              <a:rPr lang="zh-CN" altLang="en-US" dirty="0" smtClean="0"/>
-              <a:t> </a:t>
+              <a:t>I have to manually add newly opened releases in ‘triaging’ query. For example, currently we have 60P05, </a:t>
+            </a:r>
+            <a:r>
+              <a:rPr lang="en-US" altLang="zh-CN" smtClean="0"/>
+              <a:t>I have to </a:t>
             </a:r>
             <a:r>
               <a:rPr lang="en-US" altLang="zh-CN" dirty="0" smtClean="0"/>
-              <a:t>give</a:t>
-            </a:r>
-            <a:r>
-              <a:rPr lang="zh-CN" altLang="en-US" dirty="0" smtClean="0"/>
-              <a:t> </a:t>
-            </a:r>
-            <a:r>
-              <a:rPr lang="en-US" altLang="zh-CN" dirty="0" smtClean="0"/>
-              <a:t>suggestions</a:t>
-            </a:r>
-            <a:r>
-              <a:rPr lang="zh-CN" altLang="en-US" dirty="0" smtClean="0"/>
-              <a:t> </a:t>
-            </a:r>
-            <a:r>
-              <a:rPr lang="en-US" altLang="zh-CN" dirty="0" smtClean="0"/>
-              <a:t>to</a:t>
-            </a:r>
-            <a:r>
-              <a:rPr lang="zh-CN" altLang="en-US" dirty="0" smtClean="0"/>
-              <a:t> </a:t>
-            </a:r>
-            <a:r>
-              <a:rPr lang="en-US" altLang="zh-CN" dirty="0" smtClean="0"/>
-              <a:t>improve</a:t>
-            </a:r>
-            <a:r>
-              <a:rPr lang="zh-CN" altLang="en-US" dirty="0" smtClean="0"/>
-              <a:t> </a:t>
-            </a:r>
-            <a:r>
-              <a:rPr lang="en-US" altLang="zh-CN" dirty="0" smtClean="0"/>
-              <a:t>it</a:t>
-            </a:r>
+              <a:t>add 60P06 when it is available.</a:t>
+            </a:r>
+          </a:p>
+          <a:p>
+            <a:pPr marL="285750" indent="-285750">
+              <a:buFont typeface="Wingdings" panose="05000000000000000000" pitchFamily="2" charset="2"/>
+              <a:buChar char="v"/>
+            </a:pPr>
             <a:endParaRPr lang="zh-CN" altLang="en-US" dirty="0"/>
           </a:p>
         </p:txBody>
@@ -27455,7 +27636,7 @@
           <p:nvPr>
             <p:extLst>
               <p:ext uri="{D42A27DB-BD31-4B8C-83A1-F6EECF244321}">
-                <p14:modId xmlns:p14="http://schemas.microsoft.com/office/powerpoint/2010/main" val="1465522004"/>
+                <p14:modId xmlns:p14="http://schemas.microsoft.com/office/powerpoint/2010/main" val="3801715267"/>
               </p:ext>
             </p:extLst>
           </p:nvPr>
@@ -27611,7 +27792,7 @@
             <p:ph idx="1"/>
             <p:extLst>
               <p:ext uri="{D42A27DB-BD31-4B8C-83A1-F6EECF244321}">
-                <p14:modId xmlns:p14="http://schemas.microsoft.com/office/powerpoint/2010/main" val="914371551"/>
+                <p14:modId xmlns:p14="http://schemas.microsoft.com/office/powerpoint/2010/main" val="4090450586"/>
               </p:ext>
             </p:extLst>
           </p:nvPr>
@@ -27682,7 +27863,26 @@
               <a:rPr lang="en-US" dirty="0" smtClean="0"/>
               <a:t>Background</a:t>
             </a:r>
-            <a:endParaRPr lang="en-US" dirty="0"/>
+            <a:br>
+              <a:rPr lang="en-US" dirty="0" smtClean="0"/>
+            </a:br>
+            <a:r>
+              <a:rPr lang="en-US" sz="2800" dirty="0" smtClean="0">
+                <a:solidFill>
+                  <a:schemeClr val="accent2">
+                    <a:lumMod val="75000"/>
+                  </a:schemeClr>
+                </a:solidFill>
+              </a:rPr>
+              <a:t>What made us what to change …</a:t>
+            </a:r>
+            <a:endParaRPr lang="en-US" sz="2800" dirty="0">
+              <a:solidFill>
+                <a:schemeClr val="accent2">
+                  <a:lumMod val="75000"/>
+                </a:schemeClr>
+              </a:solidFill>
+            </a:endParaRPr>
           </a:p>
         </p:txBody>
       </p:sp>
@@ -27878,259 +28078,6 @@
       </p:grpSpPr>
       <p:sp>
         <p:nvSpPr>
-          <p:cNvPr id="2" name="标题 1"/>
-          <p:cNvSpPr>
-            <a:spLocks noGrp="1"/>
-          </p:cNvSpPr>
-          <p:nvPr>
-            <p:ph type="title"/>
-          </p:nvPr>
-        </p:nvSpPr>
-        <p:spPr/>
-        <p:txBody>
-          <a:bodyPr/>
-          <a:lstStyle/>
-          <a:p>
-            <a:r>
-              <a:rPr lang="en-US" altLang="zh-CN" dirty="0"/>
-              <a:t>Triage tracking </a:t>
-            </a:r>
-            <a:r>
-              <a:rPr lang="en-US" altLang="zh-CN" dirty="0" smtClean="0"/>
-              <a:t>system</a:t>
-            </a:r>
-            <a:br>
-              <a:rPr lang="en-US" altLang="zh-CN" dirty="0" smtClean="0"/>
-            </a:br>
-            <a:r>
-              <a:rPr lang="en-US" altLang="zh-CN" sz="3200" dirty="0" smtClean="0">
-                <a:solidFill>
-                  <a:schemeClr val="accent2">
-                    <a:lumMod val="75000"/>
-                  </a:schemeClr>
-                </a:solidFill>
-              </a:rPr>
-              <a:t>Modules</a:t>
-            </a:r>
-            <a:endParaRPr kumimoji="1" lang="zh-CN" altLang="en-US" sz="3200" dirty="0">
-              <a:solidFill>
-                <a:schemeClr val="accent2">
-                  <a:lumMod val="75000"/>
-                </a:schemeClr>
-              </a:solidFill>
-            </a:endParaRPr>
-          </a:p>
-        </p:txBody>
-      </p:sp>
-      <p:sp>
-        <p:nvSpPr>
-          <p:cNvPr id="4" name="页脚占位符 3"/>
-          <p:cNvSpPr>
-            <a:spLocks noGrp="1"/>
-          </p:cNvSpPr>
-          <p:nvPr>
-            <p:ph type="ftr" sz="quarter" idx="11"/>
-          </p:nvPr>
-        </p:nvSpPr>
-        <p:spPr/>
-        <p:txBody>
-          <a:bodyPr/>
-          <a:lstStyle/>
-          <a:p>
-            <a:r>
-              <a:rPr lang="en-US" smtClean="0"/>
-              <a:t>CONFIDENTIAL</a:t>
-            </a:r>
-            <a:endParaRPr lang="en-US" dirty="0"/>
-          </a:p>
-        </p:txBody>
-      </p:sp>
-      <p:sp>
-        <p:nvSpPr>
-          <p:cNvPr id="5" name="幻灯片编号占位符 4"/>
-          <p:cNvSpPr>
-            <a:spLocks noGrp="1"/>
-          </p:cNvSpPr>
-          <p:nvPr>
-            <p:ph type="sldNum" sz="quarter" idx="12"/>
-          </p:nvPr>
-        </p:nvSpPr>
-        <p:spPr/>
-        <p:txBody>
-          <a:bodyPr/>
-          <a:lstStyle/>
-          <a:p>
-            <a:fld id="{6EA6D8CF-3CDE-4807-BCD2-C9F2B831AAA5}" type="slidenum">
-              <a:rPr lang="en-US" smtClean="0"/>
-              <a:pPr/>
-              <a:t>5</a:t>
-            </a:fld>
-            <a:endParaRPr lang="en-US" dirty="0"/>
-          </a:p>
-        </p:txBody>
-      </p:sp>
-      <p:sp>
-        <p:nvSpPr>
-          <p:cNvPr id="7" name="内容占位符 6"/>
-          <p:cNvSpPr>
-            <a:spLocks noGrp="1"/>
-          </p:cNvSpPr>
-          <p:nvPr>
-            <p:ph idx="1"/>
-          </p:nvPr>
-        </p:nvSpPr>
-        <p:spPr/>
-        <p:txBody>
-          <a:bodyPr/>
-          <a:lstStyle/>
-          <a:p>
-            <a:pPr lvl="0"/>
-            <a:r>
-              <a:rPr lang="en-US" altLang="zh-CN" b="1" dirty="0">
-                <a:solidFill>
-                  <a:schemeClr val="accent1">
-                    <a:lumMod val="40000"/>
-                    <a:lumOff val="60000"/>
-                  </a:schemeClr>
-                </a:solidFill>
-              </a:rPr>
-              <a:t>Triage</a:t>
-            </a:r>
-            <a:r>
-              <a:rPr lang="en-US" altLang="zh-CN" dirty="0"/>
-              <a:t>	</a:t>
-            </a:r>
-            <a:r>
-              <a:rPr lang="en-US" altLang="zh-CN" dirty="0" smtClean="0"/>
-              <a:t>Main </a:t>
-            </a:r>
-            <a:r>
-              <a:rPr lang="en-US" altLang="zh-CN" dirty="0"/>
-              <a:t>routine which run periodically </a:t>
-            </a:r>
-            <a:r>
-              <a:rPr lang="en-US" altLang="zh-CN" dirty="0" smtClean="0"/>
-              <a:t>to grab </a:t>
-            </a:r>
-            <a:r>
-              <a:rPr lang="en-US" altLang="zh-CN" dirty="0"/>
-              <a:t>‘triaging’ query and </a:t>
-            </a:r>
-            <a:r>
-              <a:rPr lang="en-US" altLang="zh-CN" dirty="0" smtClean="0"/>
-              <a:t>update undetermined pool, database</a:t>
-            </a:r>
-            <a:endParaRPr lang="zh-CN" altLang="en-US" dirty="0"/>
-          </a:p>
-          <a:p>
-            <a:r>
-              <a:rPr kumimoji="1" lang="en-US" altLang="zh-CN" b="1" dirty="0" err="1" smtClean="0">
-                <a:solidFill>
-                  <a:schemeClr val="accent1">
-                    <a:lumMod val="40000"/>
-                    <a:lumOff val="60000"/>
-                  </a:schemeClr>
-                </a:solidFill>
-              </a:rPr>
-              <a:t>Udtm</a:t>
-            </a:r>
-            <a:r>
-              <a:rPr kumimoji="1" lang="en-US" altLang="zh-CN" dirty="0" smtClean="0"/>
-              <a:t>	</a:t>
-            </a:r>
-            <a:r>
-              <a:rPr kumimoji="1" lang="en-US" altLang="zh-CN" dirty="0" err="1" smtClean="0"/>
-              <a:t>UnDeTerMined</a:t>
-            </a:r>
-            <a:r>
-              <a:rPr kumimoji="1" lang="en-US" altLang="zh-CN" dirty="0" smtClean="0"/>
-              <a:t> pool. A bug from ‘triaging’ query may or may not be platform’s bug. In this state, it is ‘undetermined’, and put in </a:t>
-            </a:r>
-            <a:r>
-              <a:rPr kumimoji="1" lang="en-US" altLang="zh-CN" dirty="0" err="1" smtClean="0"/>
-              <a:t>udtm</a:t>
-            </a:r>
-            <a:r>
-              <a:rPr kumimoji="1" lang="en-US" altLang="zh-CN" dirty="0" smtClean="0"/>
-              <a:t>. It will periodically called by triage to update the pool.</a:t>
-            </a:r>
-          </a:p>
-          <a:p>
-            <a:r>
-              <a:rPr kumimoji="1" lang="en-US" altLang="zh-CN" b="1" dirty="0" smtClean="0">
-                <a:solidFill>
-                  <a:schemeClr val="accent1">
-                    <a:lumMod val="40000"/>
-                    <a:lumOff val="60000"/>
-                  </a:schemeClr>
-                </a:solidFill>
-              </a:rPr>
-              <a:t>DB</a:t>
-            </a:r>
-            <a:r>
-              <a:rPr kumimoji="1" lang="en-US" altLang="zh-CN" dirty="0" smtClean="0"/>
-              <a:t>		The database which holds all the triaged platform team’s bug, including some basic information. None-closed bugs in it will be updated periodically by triage.</a:t>
-            </a:r>
-          </a:p>
-          <a:p>
-            <a:r>
-              <a:rPr kumimoji="1" lang="en-US" altLang="zh-CN" b="1" dirty="0" smtClean="0">
-                <a:solidFill>
-                  <a:schemeClr val="accent1">
-                    <a:lumMod val="40000"/>
-                    <a:lumOff val="60000"/>
-                  </a:schemeClr>
-                </a:solidFill>
-              </a:rPr>
-              <a:t>Display</a:t>
-            </a:r>
-            <a:r>
-              <a:rPr kumimoji="1" lang="en-US" altLang="zh-CN" dirty="0" smtClean="0"/>
-              <a:t>	the web framework to display the bug’s information in database and those newly found un-triaged bugs.</a:t>
-            </a:r>
-            <a:endParaRPr kumimoji="1" lang="zh-CN" altLang="en-US" dirty="0"/>
-          </a:p>
-        </p:txBody>
-      </p:sp>
-    </p:spTree>
-    <p:extLst>
-      <p:ext uri="{BB962C8B-B14F-4D97-AF65-F5344CB8AC3E}">
-        <p14:creationId xmlns:p14="http://schemas.microsoft.com/office/powerpoint/2010/main" val="1384319069"/>
-      </p:ext>
-    </p:extLst>
-  </p:cSld>
-  <p:clrMapOvr>
-    <a:masterClrMapping/>
-  </p:clrMapOvr>
-  <p:timing>
-    <p:tnLst>
-      <p:par>
-        <p:cTn id="1" dur="indefinite" restart="never" nodeType="tmRoot"/>
-      </p:par>
-    </p:tnLst>
-  </p:timing>
-</p:sld>
-</file>
-
-<file path=ppt/slides/slide6.xml><?xml version="1.0" encoding="utf-8"?>
-<p:sld xmlns:a="http://schemas.openxmlformats.org/drawingml/2006/main" xmlns:r="http://schemas.openxmlformats.org/officeDocument/2006/relationships" xmlns:p="http://schemas.openxmlformats.org/presentationml/2006/main">
-  <p:cSld>
-    <p:spTree>
-      <p:nvGrpSpPr>
-        <p:cNvPr id="1" name=""/>
-        <p:cNvGrpSpPr/>
-        <p:nvPr/>
-      </p:nvGrpSpPr>
-      <p:grpSpPr>
-        <a:xfrm>
-          <a:off x="0" y="0"/>
-          <a:ext cx="0" cy="0"/>
-          <a:chOff x="0" y="0"/>
-          <a:chExt cx="0" cy="0"/>
-        </a:xfrm>
-      </p:grpSpPr>
-      <p:sp>
-        <p:nvSpPr>
           <p:cNvPr id="2" name="Title 1"/>
           <p:cNvSpPr>
             <a:spLocks noGrp="1"/>
@@ -28212,7 +28159,7 @@
             <a:fld id="{6EA6D8CF-3CDE-4807-BCD2-C9F2B831AAA5}" type="slidenum">
               <a:rPr lang="en-US" smtClean="0"/>
               <a:pPr/>
-              <a:t>6</a:t>
+              <a:t>5</a:t>
             </a:fld>
             <a:endParaRPr lang="en-US" dirty="0"/>
           </a:p>
@@ -28756,7 +28703,6 @@
                   <a:rPr lang="en-US" sz="1200" dirty="0"/>
                   <a:t>?</a:t>
                 </a:r>
-                <a:endParaRPr lang="en-US" sz="1200" dirty="0"/>
               </a:p>
             </p:txBody>
           </p:sp>
@@ -29175,10 +29121,412 @@
           </p:grpSp>
         </p:grpSp>
       </p:grpSp>
+      <p:sp>
+        <p:nvSpPr>
+          <p:cNvPr id="3" name="Rounded Rectangle 2"/>
+          <p:cNvSpPr/>
+          <p:nvPr/>
+        </p:nvSpPr>
+        <p:spPr>
+          <a:xfrm>
+            <a:off x="9819461" y="2971800"/>
+            <a:ext cx="1608952" cy="871900"/>
+          </a:xfrm>
+          <a:prstGeom prst="roundRect">
+            <a:avLst/>
+          </a:prstGeom>
+        </p:spPr>
+        <p:style>
+          <a:lnRef idx="1">
+            <a:schemeClr val="accent3"/>
+          </a:lnRef>
+          <a:fillRef idx="3">
+            <a:schemeClr val="accent3"/>
+          </a:fillRef>
+          <a:effectRef idx="2">
+            <a:schemeClr val="accent3"/>
+          </a:effectRef>
+          <a:fontRef idx="minor">
+            <a:schemeClr val="lt1"/>
+          </a:fontRef>
+        </p:style>
+        <p:txBody>
+          <a:bodyPr rtlCol="0" anchor="ctr"/>
+          <a:lstStyle/>
+          <a:p>
+            <a:r>
+              <a:rPr lang="en-US" b="1" dirty="0" smtClean="0">
+                <a:ln w="12700">
+                  <a:solidFill>
+                    <a:schemeClr val="accent3">
+                      <a:lumMod val="50000"/>
+                    </a:schemeClr>
+                  </a:solidFill>
+                  <a:prstDash val="solid"/>
+                </a:ln>
+                <a:solidFill>
+                  <a:schemeClr val="bg1">
+                    <a:lumMod val="85000"/>
+                    <a:lumOff val="15000"/>
+                  </a:schemeClr>
+                </a:solidFill>
+                <a:effectLst>
+                  <a:innerShdw blurRad="177800">
+                    <a:schemeClr val="accent3">
+                      <a:lumMod val="50000"/>
+                    </a:schemeClr>
+                  </a:innerShdw>
+                </a:effectLst>
+              </a:rPr>
+              <a:t>Triage Lead</a:t>
+            </a:r>
+          </a:p>
+          <a:p>
+            <a:r>
+              <a:rPr lang="en-US" b="1" dirty="0" smtClean="0">
+                <a:ln w="12700">
+                  <a:solidFill>
+                    <a:schemeClr val="accent3">
+                      <a:lumMod val="50000"/>
+                    </a:schemeClr>
+                  </a:solidFill>
+                  <a:prstDash val="solid"/>
+                </a:ln>
+                <a:solidFill>
+                  <a:schemeClr val="bg1">
+                    <a:lumMod val="85000"/>
+                    <a:lumOff val="15000"/>
+                  </a:schemeClr>
+                </a:solidFill>
+                <a:effectLst>
+                  <a:innerShdw blurRad="177800">
+                    <a:schemeClr val="accent3">
+                      <a:lumMod val="50000"/>
+                    </a:schemeClr>
+                  </a:innerShdw>
+                </a:effectLst>
+              </a:rPr>
+              <a:t>Developer</a:t>
+            </a:r>
+          </a:p>
+          <a:p>
+            <a:r>
+              <a:rPr lang="en-US" b="1" dirty="0" smtClean="0">
+                <a:ln w="12700">
+                  <a:solidFill>
+                    <a:schemeClr val="accent3">
+                      <a:lumMod val="50000"/>
+                    </a:schemeClr>
+                  </a:solidFill>
+                  <a:prstDash val="solid"/>
+                </a:ln>
+                <a:solidFill>
+                  <a:schemeClr val="bg1">
+                    <a:lumMod val="85000"/>
+                    <a:lumOff val="15000"/>
+                  </a:schemeClr>
+                </a:solidFill>
+                <a:effectLst>
+                  <a:innerShdw blurRad="177800">
+                    <a:schemeClr val="accent3">
+                      <a:lumMod val="50000"/>
+                    </a:schemeClr>
+                  </a:innerShdw>
+                </a:effectLst>
+              </a:rPr>
+              <a:t>QA</a:t>
+            </a:r>
+            <a:endParaRPr lang="en-US" b="1" dirty="0">
+              <a:ln w="12700">
+                <a:solidFill>
+                  <a:schemeClr val="accent3">
+                    <a:lumMod val="50000"/>
+                  </a:schemeClr>
+                </a:solidFill>
+                <a:prstDash val="solid"/>
+              </a:ln>
+              <a:solidFill>
+                <a:schemeClr val="bg1">
+                  <a:lumMod val="85000"/>
+                  <a:lumOff val="15000"/>
+                </a:schemeClr>
+              </a:solidFill>
+              <a:effectLst>
+                <a:innerShdw blurRad="177800">
+                  <a:schemeClr val="accent3">
+                    <a:lumMod val="50000"/>
+                  </a:schemeClr>
+                </a:innerShdw>
+              </a:effectLst>
+            </a:endParaRPr>
+          </a:p>
+        </p:txBody>
+      </p:sp>
     </p:spTree>
     <p:extLst>
       <p:ext uri="{BB962C8B-B14F-4D97-AF65-F5344CB8AC3E}">
         <p14:creationId xmlns:p14="http://schemas.microsoft.com/office/powerpoint/2010/main" val="1536191557"/>
+      </p:ext>
+    </p:extLst>
+  </p:cSld>
+  <p:clrMapOvr>
+    <a:masterClrMapping/>
+  </p:clrMapOvr>
+  <p:timing>
+    <p:tnLst>
+      <p:par>
+        <p:cTn id="1" dur="indefinite" restart="never" nodeType="tmRoot"/>
+      </p:par>
+    </p:tnLst>
+  </p:timing>
+</p:sld>
+</file>
+
+<file path=ppt/slides/slide6.xml><?xml version="1.0" encoding="utf-8"?>
+<p:sld xmlns:a="http://schemas.openxmlformats.org/drawingml/2006/main" xmlns:r="http://schemas.openxmlformats.org/officeDocument/2006/relationships" xmlns:p="http://schemas.openxmlformats.org/presentationml/2006/main">
+  <p:cSld>
+    <p:spTree>
+      <p:nvGrpSpPr>
+        <p:cNvPr id="1" name=""/>
+        <p:cNvGrpSpPr/>
+        <p:nvPr/>
+      </p:nvGrpSpPr>
+      <p:grpSpPr>
+        <a:xfrm>
+          <a:off x="0" y="0"/>
+          <a:ext cx="0" cy="0"/>
+          <a:chOff x="0" y="0"/>
+          <a:chExt cx="0" cy="0"/>
+        </a:xfrm>
+      </p:grpSpPr>
+      <p:sp>
+        <p:nvSpPr>
+          <p:cNvPr id="2" name="标题 1"/>
+          <p:cNvSpPr>
+            <a:spLocks noGrp="1"/>
+          </p:cNvSpPr>
+          <p:nvPr>
+            <p:ph type="title"/>
+          </p:nvPr>
+        </p:nvSpPr>
+        <p:spPr/>
+        <p:txBody>
+          <a:bodyPr/>
+          <a:lstStyle/>
+          <a:p>
+            <a:r>
+              <a:rPr lang="en-US" altLang="zh-CN" dirty="0"/>
+              <a:t>Triage tracking </a:t>
+            </a:r>
+            <a:r>
+              <a:rPr lang="en-US" altLang="zh-CN" dirty="0" smtClean="0"/>
+              <a:t>system</a:t>
+            </a:r>
+            <a:br>
+              <a:rPr lang="en-US" altLang="zh-CN" dirty="0" smtClean="0"/>
+            </a:br>
+            <a:r>
+              <a:rPr lang="en-US" altLang="zh-CN" sz="3200" dirty="0" smtClean="0">
+                <a:solidFill>
+                  <a:schemeClr val="accent2">
+                    <a:lumMod val="75000"/>
+                  </a:schemeClr>
+                </a:solidFill>
+              </a:rPr>
+              <a:t>Modules</a:t>
+            </a:r>
+            <a:endParaRPr kumimoji="1" lang="zh-CN" altLang="en-US" sz="3200" dirty="0">
+              <a:solidFill>
+                <a:schemeClr val="accent2">
+                  <a:lumMod val="75000"/>
+                </a:schemeClr>
+              </a:solidFill>
+            </a:endParaRPr>
+          </a:p>
+        </p:txBody>
+      </p:sp>
+      <p:sp>
+        <p:nvSpPr>
+          <p:cNvPr id="4" name="页脚占位符 3"/>
+          <p:cNvSpPr>
+            <a:spLocks noGrp="1"/>
+          </p:cNvSpPr>
+          <p:nvPr>
+            <p:ph type="ftr" sz="quarter" idx="11"/>
+          </p:nvPr>
+        </p:nvSpPr>
+        <p:spPr/>
+        <p:txBody>
+          <a:bodyPr/>
+          <a:lstStyle/>
+          <a:p>
+            <a:r>
+              <a:rPr lang="en-US" smtClean="0"/>
+              <a:t>CONFIDENTIAL</a:t>
+            </a:r>
+            <a:endParaRPr lang="en-US" dirty="0"/>
+          </a:p>
+        </p:txBody>
+      </p:sp>
+      <p:sp>
+        <p:nvSpPr>
+          <p:cNvPr id="5" name="幻灯片编号占位符 4"/>
+          <p:cNvSpPr>
+            <a:spLocks noGrp="1"/>
+          </p:cNvSpPr>
+          <p:nvPr>
+            <p:ph type="sldNum" sz="quarter" idx="12"/>
+          </p:nvPr>
+        </p:nvSpPr>
+        <p:spPr/>
+        <p:txBody>
+          <a:bodyPr/>
+          <a:lstStyle/>
+          <a:p>
+            <a:fld id="{6EA6D8CF-3CDE-4807-BCD2-C9F2B831AAA5}" type="slidenum">
+              <a:rPr lang="en-US" smtClean="0"/>
+              <a:pPr/>
+              <a:t>6</a:t>
+            </a:fld>
+            <a:endParaRPr lang="en-US" dirty="0"/>
+          </a:p>
+        </p:txBody>
+      </p:sp>
+      <p:sp>
+        <p:nvSpPr>
+          <p:cNvPr id="7" name="内容占位符 6"/>
+          <p:cNvSpPr>
+            <a:spLocks noGrp="1"/>
+          </p:cNvSpPr>
+          <p:nvPr>
+            <p:ph idx="1"/>
+          </p:nvPr>
+        </p:nvSpPr>
+        <p:spPr/>
+        <p:txBody>
+          <a:bodyPr/>
+          <a:lstStyle/>
+          <a:p>
+            <a:pPr lvl="0"/>
+            <a:r>
+              <a:rPr lang="en-US" altLang="zh-CN" b="1" dirty="0">
+                <a:solidFill>
+                  <a:schemeClr val="accent1">
+                    <a:lumMod val="40000"/>
+                    <a:lumOff val="60000"/>
+                  </a:schemeClr>
+                </a:solidFill>
+              </a:rPr>
+              <a:t>Triage</a:t>
+            </a:r>
+            <a:r>
+              <a:rPr lang="en-US" altLang="zh-CN" dirty="0"/>
+              <a:t>	</a:t>
+            </a:r>
+            <a:r>
+              <a:rPr lang="en-US" altLang="zh-CN" dirty="0" smtClean="0"/>
+              <a:t>Main </a:t>
+            </a:r>
+            <a:r>
+              <a:rPr lang="en-US" altLang="zh-CN" dirty="0"/>
+              <a:t>routine which run periodically </a:t>
+            </a:r>
+            <a:r>
+              <a:rPr lang="en-US" altLang="zh-CN" dirty="0" smtClean="0"/>
+              <a:t>to grab </a:t>
+            </a:r>
+            <a:r>
+              <a:rPr lang="en-US" altLang="zh-CN" dirty="0"/>
+              <a:t>‘triaging’ query and </a:t>
+            </a:r>
+            <a:r>
+              <a:rPr lang="en-US" altLang="zh-CN" dirty="0" smtClean="0"/>
+              <a:t>update undetermined pool, database</a:t>
+            </a:r>
+            <a:endParaRPr lang="zh-CN" altLang="en-US" dirty="0"/>
+          </a:p>
+          <a:p>
+            <a:r>
+              <a:rPr kumimoji="1" lang="en-US" altLang="zh-CN" b="1" dirty="0" err="1" smtClean="0">
+                <a:solidFill>
+                  <a:schemeClr val="accent1">
+                    <a:lumMod val="40000"/>
+                    <a:lumOff val="60000"/>
+                  </a:schemeClr>
+                </a:solidFill>
+              </a:rPr>
+              <a:t>Udtm</a:t>
+            </a:r>
+            <a:r>
+              <a:rPr kumimoji="1" lang="en-US" altLang="zh-CN" dirty="0" smtClean="0"/>
+              <a:t>	</a:t>
+            </a:r>
+            <a:r>
+              <a:rPr kumimoji="1" lang="en-US" altLang="zh-CN" dirty="0" err="1" smtClean="0"/>
+              <a:t>UnDeTerMined</a:t>
+            </a:r>
+            <a:r>
+              <a:rPr kumimoji="1" lang="en-US" altLang="zh-CN" dirty="0" smtClean="0"/>
+              <a:t> pool. A bug from ‘triaging’ query may or may not be </a:t>
+            </a:r>
+            <a:r>
+              <a:rPr kumimoji="1" lang="en-US" altLang="zh-CN" dirty="0" smtClean="0"/>
+              <a:t>guest platform’s </a:t>
+            </a:r>
+            <a:r>
+              <a:rPr kumimoji="1" lang="en-US" altLang="zh-CN" dirty="0" smtClean="0"/>
+              <a:t>bug. In this state, it is ‘undetermined’, and put in </a:t>
+            </a:r>
+            <a:r>
+              <a:rPr kumimoji="1" lang="en-US" altLang="zh-CN" dirty="0" err="1" smtClean="0"/>
+              <a:t>udtm</a:t>
+            </a:r>
+            <a:r>
+              <a:rPr kumimoji="1" lang="en-US" altLang="zh-CN" dirty="0" smtClean="0"/>
+              <a:t>. It will periodically called by triage to update the pool.</a:t>
+            </a:r>
+          </a:p>
+          <a:p>
+            <a:r>
+              <a:rPr kumimoji="1" lang="en-US" altLang="zh-CN" b="1" dirty="0" smtClean="0">
+                <a:solidFill>
+                  <a:schemeClr val="accent1">
+                    <a:lumMod val="40000"/>
+                    <a:lumOff val="60000"/>
+                  </a:schemeClr>
+                </a:solidFill>
+              </a:rPr>
+              <a:t>DB</a:t>
+            </a:r>
+            <a:r>
+              <a:rPr kumimoji="1" lang="en-US" altLang="zh-CN" dirty="0" smtClean="0"/>
+              <a:t>		The database which holds all the triaged platform team’s bug, including some basic information. None-closed bugs in it will be updated periodically by triage.</a:t>
+            </a:r>
+          </a:p>
+          <a:p>
+            <a:r>
+              <a:rPr kumimoji="1" lang="en-US" altLang="zh-CN" b="1" dirty="0" smtClean="0">
+                <a:solidFill>
+                  <a:schemeClr val="accent1">
+                    <a:lumMod val="40000"/>
+                    <a:lumOff val="60000"/>
+                  </a:schemeClr>
+                </a:solidFill>
+              </a:rPr>
+              <a:t>Display</a:t>
+            </a:r>
+            <a:r>
+              <a:rPr kumimoji="1" lang="en-US" altLang="zh-CN" dirty="0" smtClean="0"/>
+              <a:t>	the web framework to display the bug’s information in database and those newly found un-triaged bugs.</a:t>
+            </a:r>
+            <a:endParaRPr kumimoji="1" lang="zh-CN" altLang="en-US" dirty="0"/>
+          </a:p>
+        </p:txBody>
+      </p:sp>
+    </p:spTree>
+    <p:extLst>
+      <p:ext uri="{BB962C8B-B14F-4D97-AF65-F5344CB8AC3E}">
+        <p14:creationId xmlns:p14="http://schemas.microsoft.com/office/powerpoint/2010/main" val="1384319069"/>
       </p:ext>
     </p:extLst>
   </p:cSld>
@@ -29315,13 +29663,13 @@
             <p:ph idx="1"/>
             <p:extLst>
               <p:ext uri="{D42A27DB-BD31-4B8C-83A1-F6EECF244321}">
-                <p14:modId xmlns:p14="http://schemas.microsoft.com/office/powerpoint/2010/main" val="945209679"/>
+                <p14:modId xmlns:p14="http://schemas.microsoft.com/office/powerpoint/2010/main" val="2313003261"/>
               </p:ext>
             </p:extLst>
           </p:nvPr>
         </p:nvGraphicFramePr>
         <p:xfrm>
-          <a:off x="1103313" y="2052638"/>
+          <a:off x="1156833" y="2514600"/>
           <a:ext cx="8943975" cy="4195762"/>
         </p:xfrm>
         <a:graphic>
@@ -29338,7 +29686,7 @@
         </p:nvSpPr>
         <p:spPr>
           <a:xfrm>
-            <a:off x="1103313" y="1853248"/>
+            <a:off x="989012" y="1887115"/>
             <a:ext cx="6972299" cy="2585323"/>
           </a:xfrm>
           <a:prstGeom prst="rect">
@@ -29378,7 +29726,19 @@
           <a:p>
             <a:r>
               <a:rPr kumimoji="1" lang="en-US" altLang="zh-CN" dirty="0" smtClean="0"/>
-              <a:t>Given that platform team’s bugs are complex. </a:t>
+              <a:t>Given that </a:t>
+            </a:r>
+            <a:r>
+              <a:rPr kumimoji="1" lang="en-US" altLang="zh-CN" dirty="0"/>
+              <a:t>guest </a:t>
+            </a:r>
+            <a:r>
+              <a:rPr kumimoji="1" lang="en-US" altLang="zh-CN" dirty="0" smtClean="0"/>
+              <a:t>platform </a:t>
+            </a:r>
+            <a:r>
+              <a:rPr kumimoji="1" lang="en-US" altLang="zh-CN" dirty="0" smtClean="0"/>
+              <a:t>team’s bugs are complex. </a:t>
             </a:r>
             <a:endParaRPr kumimoji="1" lang="zh-CN" altLang="en-US" dirty="0" smtClean="0"/>
           </a:p>
@@ -29392,7 +29752,19 @@
           <a:p>
             <a:r>
               <a:rPr kumimoji="1" lang="en-US" altLang="zh-CN" dirty="0" smtClean="0"/>
-              <a:t>all platform team’s bug</a:t>
+              <a:t>all </a:t>
+            </a:r>
+            <a:r>
+              <a:rPr kumimoji="1" lang="en-US" altLang="zh-CN" dirty="0"/>
+              <a:t>guest </a:t>
+            </a:r>
+            <a:r>
+              <a:rPr kumimoji="1" lang="en-US" altLang="zh-CN" dirty="0" smtClean="0"/>
+              <a:t>platform </a:t>
+            </a:r>
+            <a:r>
+              <a:rPr kumimoji="1" lang="en-US" altLang="zh-CN" dirty="0" smtClean="0"/>
+              <a:t>team’s bug</a:t>
             </a:r>
             <a:r>
               <a:rPr kumimoji="1" lang="zh-CN" altLang="en-US" dirty="0" smtClean="0"/>

</xml_diff>